<commit_message>
Messing up with the intro
</commit_message>
<xml_diff>
--- a/LostInTranslation.pptx
+++ b/LostInTranslation.pptx
@@ -4,10 +4,19 @@
   <p:sldMasterIdLst>
     <p:sldMasterId id="2147483648" r:id="rId1"/>
   </p:sldMasterIdLst>
+  <p:notesMasterIdLst>
+    <p:notesMasterId r:id="rId11"/>
+  </p:notesMasterIdLst>
   <p:sldIdLst>
     <p:sldId id="256" r:id="rId2"/>
     <p:sldId id="257" r:id="rId3"/>
-    <p:sldId id="258" r:id="rId4"/>
+    <p:sldId id="264" r:id="rId4"/>
+    <p:sldId id="260" r:id="rId5"/>
+    <p:sldId id="262" r:id="rId6"/>
+    <p:sldId id="263" r:id="rId7"/>
+    <p:sldId id="259" r:id="rId8"/>
+    <p:sldId id="261" r:id="rId9"/>
+    <p:sldId id="258" r:id="rId10"/>
   </p:sldIdLst>
   <p:sldSz cx="10077450" cy="7562850"/>
   <p:notesSz cx="6858000" cy="9144000"/>
@@ -139,6 +148,434 @@
 </p:presentation>
 </file>
 
+<file path=ppt/notesMasters/notesMaster1.xml><?xml version="1.0" encoding="utf-8"?>
+<p:notesMaster xmlns:a="http://schemas.openxmlformats.org/drawingml/2006/main" xmlns:r="http://schemas.openxmlformats.org/officeDocument/2006/relationships" xmlns:p="http://schemas.openxmlformats.org/presentationml/2006/main">
+  <p:cSld>
+    <p:bg>
+      <p:bgRef idx="1001">
+        <a:schemeClr val="bg1"/>
+      </p:bgRef>
+    </p:bg>
+    <p:spTree>
+      <p:nvGrpSpPr>
+        <p:cNvPr id="1" name=""/>
+        <p:cNvGrpSpPr/>
+        <p:nvPr/>
+      </p:nvGrpSpPr>
+      <p:grpSpPr>
+        <a:xfrm>
+          <a:off x="0" y="0"/>
+          <a:ext cx="0" cy="0"/>
+          <a:chOff x="0" y="0"/>
+          <a:chExt cx="0" cy="0"/>
+        </a:xfrm>
+      </p:grpSpPr>
+      <p:sp>
+        <p:nvSpPr>
+          <p:cNvPr id="2" name="Espace réservé de l'en-tête 1"/>
+          <p:cNvSpPr>
+            <a:spLocks noGrp="1"/>
+          </p:cNvSpPr>
+          <p:nvPr>
+            <p:ph type="hdr" sz="quarter"/>
+          </p:nvPr>
+        </p:nvSpPr>
+        <p:spPr>
+          <a:xfrm>
+            <a:off x="0" y="0"/>
+            <a:ext cx="2971800" cy="457200"/>
+          </a:xfrm>
+          <a:prstGeom prst="rect">
+            <a:avLst/>
+          </a:prstGeom>
+        </p:spPr>
+        <p:txBody>
+          <a:bodyPr vert="horz" lIns="91440" tIns="45720" rIns="91440" bIns="45720" rtlCol="0"/>
+          <a:lstStyle>
+            <a:lvl1pPr algn="l">
+              <a:defRPr sz="1200"/>
+            </a:lvl1pPr>
+          </a:lstStyle>
+          <a:p>
+            <a:endParaRPr lang="de-DE"/>
+          </a:p>
+        </p:txBody>
+      </p:sp>
+      <p:sp>
+        <p:nvSpPr>
+          <p:cNvPr id="3" name="Espace réservé de la date 2"/>
+          <p:cNvSpPr>
+            <a:spLocks noGrp="1"/>
+          </p:cNvSpPr>
+          <p:nvPr>
+            <p:ph type="dt" idx="1"/>
+          </p:nvPr>
+        </p:nvSpPr>
+        <p:spPr>
+          <a:xfrm>
+            <a:off x="3884613" y="0"/>
+            <a:ext cx="2971800" cy="457200"/>
+          </a:xfrm>
+          <a:prstGeom prst="rect">
+            <a:avLst/>
+          </a:prstGeom>
+        </p:spPr>
+        <p:txBody>
+          <a:bodyPr vert="horz" lIns="91440" tIns="45720" rIns="91440" bIns="45720" rtlCol="0"/>
+          <a:lstStyle>
+            <a:lvl1pPr algn="r">
+              <a:defRPr sz="1200"/>
+            </a:lvl1pPr>
+          </a:lstStyle>
+          <a:p>
+            <a:fld id="{A2BE54E9-7BA2-472D-BD61-AFB6D4D6045A}" type="datetimeFigureOut">
+              <a:rPr lang="de-DE" smtClean="0"/>
+              <a:t>15.03.2014</a:t>
+            </a:fld>
+            <a:endParaRPr lang="de-DE"/>
+          </a:p>
+        </p:txBody>
+      </p:sp>
+      <p:sp>
+        <p:nvSpPr>
+          <p:cNvPr id="4" name="Espace réservé de l'image des diapositives 3"/>
+          <p:cNvSpPr>
+            <a:spLocks noGrp="1" noRot="1" noChangeAspect="1"/>
+          </p:cNvSpPr>
+          <p:nvPr>
+            <p:ph type="sldImg" idx="2"/>
+          </p:nvPr>
+        </p:nvSpPr>
+        <p:spPr>
+          <a:xfrm>
+            <a:off x="1144588" y="685800"/>
+            <a:ext cx="4568825" cy="3429000"/>
+          </a:xfrm>
+          <a:prstGeom prst="rect">
+            <a:avLst/>
+          </a:prstGeom>
+          <a:noFill/>
+          <a:ln w="12700">
+            <a:solidFill>
+              <a:prstClr val="black"/>
+            </a:solidFill>
+          </a:ln>
+        </p:spPr>
+        <p:txBody>
+          <a:bodyPr vert="horz" lIns="91440" tIns="45720" rIns="91440" bIns="45720" rtlCol="0" anchor="ctr"/>
+          <a:lstStyle/>
+          <a:p>
+            <a:endParaRPr lang="de-DE"/>
+          </a:p>
+        </p:txBody>
+      </p:sp>
+      <p:sp>
+        <p:nvSpPr>
+          <p:cNvPr id="5" name="Espace réservé des commentaires 4"/>
+          <p:cNvSpPr>
+            <a:spLocks noGrp="1"/>
+          </p:cNvSpPr>
+          <p:nvPr>
+            <p:ph type="body" sz="quarter" idx="3"/>
+          </p:nvPr>
+        </p:nvSpPr>
+        <p:spPr>
+          <a:xfrm>
+            <a:off x="685800" y="4343400"/>
+            <a:ext cx="5486400" cy="4114800"/>
+          </a:xfrm>
+          <a:prstGeom prst="rect">
+            <a:avLst/>
+          </a:prstGeom>
+        </p:spPr>
+        <p:txBody>
+          <a:bodyPr vert="horz" lIns="91440" tIns="45720" rIns="91440" bIns="45720" rtlCol="0">
+            <a:normAutofit/>
+          </a:bodyPr>
+          <a:lstStyle/>
+          <a:p>
+            <a:pPr lvl="0"/>
+            <a:r>
+              <a:rPr lang="fr-FR" smtClean="0"/>
+              <a:t>Cliquez pour modifier les styles du texte du masque</a:t>
+            </a:r>
+          </a:p>
+          <a:p>
+            <a:pPr lvl="1"/>
+            <a:r>
+              <a:rPr lang="fr-FR" smtClean="0"/>
+              <a:t>Deuxième niveau</a:t>
+            </a:r>
+          </a:p>
+          <a:p>
+            <a:pPr lvl="2"/>
+            <a:r>
+              <a:rPr lang="fr-FR" smtClean="0"/>
+              <a:t>Troisième niveau</a:t>
+            </a:r>
+          </a:p>
+          <a:p>
+            <a:pPr lvl="3"/>
+            <a:r>
+              <a:rPr lang="fr-FR" smtClean="0"/>
+              <a:t>Quatrième niveau</a:t>
+            </a:r>
+          </a:p>
+          <a:p>
+            <a:pPr lvl="4"/>
+            <a:r>
+              <a:rPr lang="fr-FR" smtClean="0"/>
+              <a:t>Cinquième niveau</a:t>
+            </a:r>
+            <a:endParaRPr lang="de-DE"/>
+          </a:p>
+        </p:txBody>
+      </p:sp>
+      <p:sp>
+        <p:nvSpPr>
+          <p:cNvPr id="6" name="Espace réservé du pied de page 5"/>
+          <p:cNvSpPr>
+            <a:spLocks noGrp="1"/>
+          </p:cNvSpPr>
+          <p:nvPr>
+            <p:ph type="ftr" sz="quarter" idx="4"/>
+          </p:nvPr>
+        </p:nvSpPr>
+        <p:spPr>
+          <a:xfrm>
+            <a:off x="0" y="8685213"/>
+            <a:ext cx="2971800" cy="457200"/>
+          </a:xfrm>
+          <a:prstGeom prst="rect">
+            <a:avLst/>
+          </a:prstGeom>
+        </p:spPr>
+        <p:txBody>
+          <a:bodyPr vert="horz" lIns="91440" tIns="45720" rIns="91440" bIns="45720" rtlCol="0" anchor="b"/>
+          <a:lstStyle>
+            <a:lvl1pPr algn="l">
+              <a:defRPr sz="1200"/>
+            </a:lvl1pPr>
+          </a:lstStyle>
+          <a:p>
+            <a:endParaRPr lang="de-DE"/>
+          </a:p>
+        </p:txBody>
+      </p:sp>
+      <p:sp>
+        <p:nvSpPr>
+          <p:cNvPr id="7" name="Espace réservé du numéro de diapositive 6"/>
+          <p:cNvSpPr>
+            <a:spLocks noGrp="1"/>
+          </p:cNvSpPr>
+          <p:nvPr>
+            <p:ph type="sldNum" sz="quarter" idx="5"/>
+          </p:nvPr>
+        </p:nvSpPr>
+        <p:spPr>
+          <a:xfrm>
+            <a:off x="3884613" y="8685213"/>
+            <a:ext cx="2971800" cy="457200"/>
+          </a:xfrm>
+          <a:prstGeom prst="rect">
+            <a:avLst/>
+          </a:prstGeom>
+        </p:spPr>
+        <p:txBody>
+          <a:bodyPr vert="horz" lIns="91440" tIns="45720" rIns="91440" bIns="45720" rtlCol="0" anchor="b"/>
+          <a:lstStyle>
+            <a:lvl1pPr algn="r">
+              <a:defRPr sz="1200"/>
+            </a:lvl1pPr>
+          </a:lstStyle>
+          <a:p>
+            <a:fld id="{5507F771-08A0-44CF-83A0-6E937EB8C3C4}" type="slidenum">
+              <a:rPr lang="de-DE" smtClean="0"/>
+              <a:t>‹N°›</a:t>
+            </a:fld>
+            <a:endParaRPr lang="de-DE"/>
+          </a:p>
+        </p:txBody>
+      </p:sp>
+    </p:spTree>
+  </p:cSld>
+  <p:clrMap bg1="lt1" tx1="dk1" bg2="lt2" tx2="dk2" accent1="accent1" accent2="accent2" accent3="accent3" accent4="accent4" accent5="accent5" accent6="accent6" hlink="hlink" folHlink="folHlink"/>
+  <p:notesStyle>
+    <a:lvl1pPr marL="0" algn="l" defTabSz="914400" rtl="0" eaLnBrk="1" latinLnBrk="0" hangingPunct="1">
+      <a:defRPr sz="1200" kern="1200">
+        <a:solidFill>
+          <a:schemeClr val="tx1"/>
+        </a:solidFill>
+        <a:latin typeface="+mn-lt"/>
+        <a:ea typeface="+mn-ea"/>
+        <a:cs typeface="+mn-cs"/>
+      </a:defRPr>
+    </a:lvl1pPr>
+    <a:lvl2pPr marL="457200" algn="l" defTabSz="914400" rtl="0" eaLnBrk="1" latinLnBrk="0" hangingPunct="1">
+      <a:defRPr sz="1200" kern="1200">
+        <a:solidFill>
+          <a:schemeClr val="tx1"/>
+        </a:solidFill>
+        <a:latin typeface="+mn-lt"/>
+        <a:ea typeface="+mn-ea"/>
+        <a:cs typeface="+mn-cs"/>
+      </a:defRPr>
+    </a:lvl2pPr>
+    <a:lvl3pPr marL="914400" algn="l" defTabSz="914400" rtl="0" eaLnBrk="1" latinLnBrk="0" hangingPunct="1">
+      <a:defRPr sz="1200" kern="1200">
+        <a:solidFill>
+          <a:schemeClr val="tx1"/>
+        </a:solidFill>
+        <a:latin typeface="+mn-lt"/>
+        <a:ea typeface="+mn-ea"/>
+        <a:cs typeface="+mn-cs"/>
+      </a:defRPr>
+    </a:lvl3pPr>
+    <a:lvl4pPr marL="1371600" algn="l" defTabSz="914400" rtl="0" eaLnBrk="1" latinLnBrk="0" hangingPunct="1">
+      <a:defRPr sz="1200" kern="1200">
+        <a:solidFill>
+          <a:schemeClr val="tx1"/>
+        </a:solidFill>
+        <a:latin typeface="+mn-lt"/>
+        <a:ea typeface="+mn-ea"/>
+        <a:cs typeface="+mn-cs"/>
+      </a:defRPr>
+    </a:lvl4pPr>
+    <a:lvl5pPr marL="1828800" algn="l" defTabSz="914400" rtl="0" eaLnBrk="1" latinLnBrk="0" hangingPunct="1">
+      <a:defRPr sz="1200" kern="1200">
+        <a:solidFill>
+          <a:schemeClr val="tx1"/>
+        </a:solidFill>
+        <a:latin typeface="+mn-lt"/>
+        <a:ea typeface="+mn-ea"/>
+        <a:cs typeface="+mn-cs"/>
+      </a:defRPr>
+    </a:lvl5pPr>
+    <a:lvl6pPr marL="2286000" algn="l" defTabSz="914400" rtl="0" eaLnBrk="1" latinLnBrk="0" hangingPunct="1">
+      <a:defRPr sz="1200" kern="1200">
+        <a:solidFill>
+          <a:schemeClr val="tx1"/>
+        </a:solidFill>
+        <a:latin typeface="+mn-lt"/>
+        <a:ea typeface="+mn-ea"/>
+        <a:cs typeface="+mn-cs"/>
+      </a:defRPr>
+    </a:lvl6pPr>
+    <a:lvl7pPr marL="2743200" algn="l" defTabSz="914400" rtl="0" eaLnBrk="1" latinLnBrk="0" hangingPunct="1">
+      <a:defRPr sz="1200" kern="1200">
+        <a:solidFill>
+          <a:schemeClr val="tx1"/>
+        </a:solidFill>
+        <a:latin typeface="+mn-lt"/>
+        <a:ea typeface="+mn-ea"/>
+        <a:cs typeface="+mn-cs"/>
+      </a:defRPr>
+    </a:lvl7pPr>
+    <a:lvl8pPr marL="3200400" algn="l" defTabSz="914400" rtl="0" eaLnBrk="1" latinLnBrk="0" hangingPunct="1">
+      <a:defRPr sz="1200" kern="1200">
+        <a:solidFill>
+          <a:schemeClr val="tx1"/>
+        </a:solidFill>
+        <a:latin typeface="+mn-lt"/>
+        <a:ea typeface="+mn-ea"/>
+        <a:cs typeface="+mn-cs"/>
+      </a:defRPr>
+    </a:lvl8pPr>
+    <a:lvl9pPr marL="3657600" algn="l" defTabSz="914400" rtl="0" eaLnBrk="1" latinLnBrk="0" hangingPunct="1">
+      <a:defRPr sz="1200" kern="1200">
+        <a:solidFill>
+          <a:schemeClr val="tx1"/>
+        </a:solidFill>
+        <a:latin typeface="+mn-lt"/>
+        <a:ea typeface="+mn-ea"/>
+        <a:cs typeface="+mn-cs"/>
+      </a:defRPr>
+    </a:lvl9pPr>
+  </p:notesStyle>
+</p:notesMaster>
+</file>
+
+<file path=ppt/notesSlides/notesSlide1.xml><?xml version="1.0" encoding="utf-8"?>
+<p:notes xmlns:a="http://schemas.openxmlformats.org/drawingml/2006/main" xmlns:r="http://schemas.openxmlformats.org/officeDocument/2006/relationships" xmlns:p="http://schemas.openxmlformats.org/presentationml/2006/main">
+  <p:cSld>
+    <p:spTree>
+      <p:nvGrpSpPr>
+        <p:cNvPr id="1" name=""/>
+        <p:cNvGrpSpPr/>
+        <p:nvPr/>
+      </p:nvGrpSpPr>
+      <p:grpSpPr>
+        <a:xfrm>
+          <a:off x="0" y="0"/>
+          <a:ext cx="0" cy="0"/>
+          <a:chOff x="0" y="0"/>
+          <a:chExt cx="0" cy="0"/>
+        </a:xfrm>
+      </p:grpSpPr>
+      <p:sp>
+        <p:nvSpPr>
+          <p:cNvPr id="2" name="Espace réservé de l'image des diapositives 1"/>
+          <p:cNvSpPr>
+            <a:spLocks noGrp="1" noRot="1" noChangeAspect="1"/>
+          </p:cNvSpPr>
+          <p:nvPr>
+            <p:ph type="sldImg"/>
+          </p:nvPr>
+        </p:nvSpPr>
+        <p:spPr/>
+      </p:sp>
+      <p:sp>
+        <p:nvSpPr>
+          <p:cNvPr id="3" name="Espace réservé des commentaires 2"/>
+          <p:cNvSpPr>
+            <a:spLocks noGrp="1"/>
+          </p:cNvSpPr>
+          <p:nvPr>
+            <p:ph type="body" idx="1"/>
+          </p:nvPr>
+        </p:nvSpPr>
+        <p:spPr/>
+        <p:txBody>
+          <a:bodyPr>
+            <a:normAutofit/>
+          </a:bodyPr>
+          <a:lstStyle/>
+          <a:p>
+            <a:endParaRPr lang="de-DE"/>
+          </a:p>
+        </p:txBody>
+      </p:sp>
+      <p:sp>
+        <p:nvSpPr>
+          <p:cNvPr id="4" name="Espace réservé du numéro de diapositive 3"/>
+          <p:cNvSpPr>
+            <a:spLocks noGrp="1"/>
+          </p:cNvSpPr>
+          <p:nvPr>
+            <p:ph type="sldNum" sz="quarter" idx="10"/>
+          </p:nvPr>
+        </p:nvSpPr>
+        <p:spPr/>
+        <p:txBody>
+          <a:bodyPr/>
+          <a:lstStyle/>
+          <a:p>
+            <a:fld id="{5507F771-08A0-44CF-83A0-6E937EB8C3C4}" type="slidenum">
+              <a:rPr lang="de-DE" smtClean="0"/>
+              <a:t>8</a:t>
+            </a:fld>
+            <a:endParaRPr lang="de-DE"/>
+          </a:p>
+        </p:txBody>
+      </p:sp>
+    </p:spTree>
+  </p:cSld>
+  <p:clrMapOvr>
+    <a:masterClrMapping/>
+  </p:clrMapOvr>
+</p:notes>
+</file>
+
 <file path=ppt/slideLayouts/slideLayout1.xml><?xml version="1.0" encoding="utf-8"?>
 <p:sldLayout xmlns:a="http://schemas.openxmlformats.org/drawingml/2006/main" xmlns:r="http://schemas.openxmlformats.org/officeDocument/2006/relationships" xmlns:p="http://schemas.openxmlformats.org/presentationml/2006/main" preserve="1" userDrawn="1">
   <p:cSld name="Titelfolie">
@@ -159,7 +596,7 @@
     </p:spTree>
     <p:extLst>
       <p:ext uri="{BB962C8B-B14F-4D97-AF65-F5344CB8AC3E}">
-        <p14:creationId xmlns:p14="http://schemas.microsoft.com/office/powerpoint/2010/main" xmlns="" val="2650644693"/>
+        <p14:creationId xmlns="" xmlns:p14="http://schemas.microsoft.com/office/powerpoint/2010/main" val="2650644693"/>
       </p:ext>
     </p:extLst>
   </p:cSld>
@@ -295,7 +732,7 @@
     </p:spTree>
     <p:extLst>
       <p:ext uri="{BB962C8B-B14F-4D97-AF65-F5344CB8AC3E}">
-        <p14:creationId xmlns:p14="http://schemas.microsoft.com/office/powerpoint/2010/main" xmlns="" val="2216279648"/>
+        <p14:creationId xmlns="" xmlns:p14="http://schemas.microsoft.com/office/powerpoint/2010/main" val="2216279648"/>
       </p:ext>
     </p:extLst>
   </p:cSld>
@@ -687,7 +1124,7 @@
     </p:spTree>
     <p:extLst>
       <p:ext uri="{BB962C8B-B14F-4D97-AF65-F5344CB8AC3E}">
-        <p14:creationId xmlns:p14="http://schemas.microsoft.com/office/powerpoint/2010/main" xmlns="" val="3499934541"/>
+        <p14:creationId xmlns="" xmlns:p14="http://schemas.microsoft.com/office/powerpoint/2010/main" val="3499934541"/>
       </p:ext>
     </p:extLst>
   </p:cSld>
@@ -743,14 +1180,14 @@
           </a:ln>
           <a:extLst>
             <a:ext uri="{909E8E84-426E-40dd-AFC4-6F175D3DCCD1}">
-              <a14:hiddenFill xmlns:a14="http://schemas.microsoft.com/office/drawing/2010/main" xmlns="">
+              <a14:hiddenFill xmlns="" xmlns:a14="http://schemas.microsoft.com/office/drawing/2010/main">
                 <a:solidFill>
                   <a:srgbClr val="FFFFFF"/>
                 </a:solidFill>
               </a14:hiddenFill>
             </a:ext>
             <a:ext uri="{91240B29-F687-4f45-9708-019B960494DF}">
-              <a14:hiddenLine xmlns:a14="http://schemas.microsoft.com/office/drawing/2010/main" xmlns="" w="9525">
+              <a14:hiddenLine xmlns="" xmlns:a14="http://schemas.microsoft.com/office/drawing/2010/main" w="9525">
                 <a:solidFill>
                   <a:srgbClr val="000000"/>
                 </a:solidFill>
@@ -760,7 +1197,7 @@
               </a14:hiddenLine>
             </a:ext>
             <a:ext uri="{FAA26D3D-D897-4be2-8F04-BA451C77F1D7}">
-              <ma14:placeholderFlag xmlns:ma14="http://schemas.microsoft.com/office/mac/drawingml/2011/main" xmlns="" val="1"/>
+              <ma14:placeholderFlag xmlns="" xmlns:ma14="http://schemas.microsoft.com/office/mac/drawingml/2011/main" val="1"/>
             </a:ext>
           </a:extLst>
         </p:spPr>
@@ -804,14 +1241,14 @@
           </a:ln>
           <a:extLst>
             <a:ext uri="{909E8E84-426E-40dd-AFC4-6F175D3DCCD1}">
-              <a14:hiddenFill xmlns:a14="http://schemas.microsoft.com/office/drawing/2010/main" xmlns="">
+              <a14:hiddenFill xmlns="" xmlns:a14="http://schemas.microsoft.com/office/drawing/2010/main">
                 <a:solidFill>
                   <a:srgbClr val="FFFFFF"/>
                 </a:solidFill>
               </a14:hiddenFill>
             </a:ext>
             <a:ext uri="{91240B29-F687-4f45-9708-019B960494DF}">
-              <a14:hiddenLine xmlns:a14="http://schemas.microsoft.com/office/drawing/2010/main" xmlns="" w="9525">
+              <a14:hiddenLine xmlns="" xmlns:a14="http://schemas.microsoft.com/office/drawing/2010/main" w="9525">
                 <a:solidFill>
                   <a:srgbClr val="000000"/>
                 </a:solidFill>
@@ -821,7 +1258,7 @@
               </a14:hiddenLine>
             </a:ext>
             <a:ext uri="{FAA26D3D-D897-4be2-8F04-BA451C77F1D7}">
-              <ma14:placeholderFlag xmlns:ma14="http://schemas.microsoft.com/office/mac/drawingml/2011/main" xmlns="" val="1"/>
+              <ma14:placeholderFlag xmlns="" xmlns:ma14="http://schemas.microsoft.com/office/mac/drawingml/2011/main" val="1"/>
             </a:ext>
           </a:extLst>
         </p:spPr>
@@ -1170,7 +1607,7 @@
           <a:blip r:embed="rId5">
             <a:extLst>
               <a:ext uri="{28A0092B-C50C-407E-A947-70E740481C1C}">
-                <a14:useLocalDpi xmlns:a14="http://schemas.microsoft.com/office/drawing/2010/main" xmlns="" val="0"/>
+                <a14:useLocalDpi xmlns="" xmlns:a14="http://schemas.microsoft.com/office/drawing/2010/main" val="0"/>
               </a:ext>
             </a:extLst>
           </a:blip>
@@ -1645,14 +2082,14 @@
           </a:ln>
           <a:extLst>
             <a:ext uri="{909E8E84-426E-40dd-AFC4-6F175D3DCCD1}">
-              <a14:hiddenFill xmlns:a14="http://schemas.microsoft.com/office/drawing/2010/main" xmlns="">
+              <a14:hiddenFill xmlns="" xmlns:a14="http://schemas.microsoft.com/office/drawing/2010/main">
                 <a:solidFill>
                   <a:srgbClr val="FFFFFF"/>
                 </a:solidFill>
               </a14:hiddenFill>
             </a:ext>
             <a:ext uri="{91240B29-F687-4f45-9708-019B960494DF}">
-              <a14:hiddenLine xmlns:a14="http://schemas.microsoft.com/office/drawing/2010/main" xmlns="" w="9525">
+              <a14:hiddenLine xmlns="" xmlns:a14="http://schemas.microsoft.com/office/drawing/2010/main" w="9525">
                 <a:solidFill>
                   <a:srgbClr val="000000"/>
                 </a:solidFill>
@@ -1782,15 +2219,7 @@
           <a:p>
             <a:r>
               <a:rPr lang="de-DE" sz="2800" b="1" dirty="0" smtClean="0"/>
-              <a:t>Reguläre </a:t>
-            </a:r>
-            <a:r>
-              <a:rPr lang="de-DE" sz="2800" b="1" dirty="0" smtClean="0"/>
-              <a:t>Ausdrücke </a:t>
-            </a:r>
-            <a:r>
-              <a:rPr lang="de-DE" sz="2800" b="1" dirty="0" smtClean="0"/>
-              <a:t>als Englische Sätze</a:t>
+              <a:t>Reguläre Ausdrücke als Englische Sätze</a:t>
             </a:r>
           </a:p>
           <a:p>
@@ -1854,6 +2283,13 @@
   <p:clrMapOvr>
     <a:masterClrMapping/>
   </p:clrMapOvr>
+  <p:timing>
+    <p:tnLst>
+      <p:par>
+        <p:cTn id="1" dur="indefinite" restart="never" nodeType="tmRoot"/>
+      </p:par>
+    </p:tnLst>
+  </p:timing>
 </p:sld>
 </file>
 
@@ -1891,12 +2327,843 @@
           <a:p>
             <a:pPr eaLnBrk="1" hangingPunct="1"/>
             <a:r>
-              <a:rPr lang="de-DE">
+              <a:rPr lang="en-US" dirty="0" smtClean="0">
                 <a:latin typeface="Arial" charset="0"/>
                 <a:ea typeface="ＭＳ Ｐゴシック" charset="0"/>
               </a:rPr>
-              <a:t>Titel (24pt, fett)</a:t>
-            </a:r>
+              <a:t>TL;DR;</a:t>
+            </a:r>
+            <a:endParaRPr lang="de-DE" dirty="0">
+              <a:latin typeface="Arial" charset="0"/>
+              <a:ea typeface="ＭＳ Ｐゴシック" charset="0"/>
+            </a:endParaRPr>
+          </a:p>
+        </p:txBody>
+      </p:sp>
+      <p:sp>
+        <p:nvSpPr>
+          <p:cNvPr id="6147" name="Inhaltsplatzhalter 2"/>
+          <p:cNvSpPr>
+            <a:spLocks noGrp="1"/>
+          </p:cNvSpPr>
+          <p:nvPr>
+            <p:ph idx="1"/>
+          </p:nvPr>
+        </p:nvSpPr>
+        <p:spPr>
+          <a:xfrm>
+            <a:off x="619263" y="1784433"/>
+            <a:ext cx="8952120" cy="5164361"/>
+          </a:xfrm>
+        </p:spPr>
+        <p:txBody>
+          <a:bodyPr/>
+          <a:lstStyle/>
+          <a:p>
+            <a:r>
+              <a:rPr lang="en-US" dirty="0" smtClean="0"/>
+              <a:t>Why express yourself like this?</a:t>
+            </a:r>
+          </a:p>
+          <a:p>
+            <a:endParaRPr lang="en-US" dirty="0" smtClean="0"/>
+          </a:p>
+          <a:p>
+            <a:endParaRPr lang="en-US" dirty="0" smtClean="0"/>
+          </a:p>
+          <a:p>
+            <a:r>
+              <a:rPr lang="en-US" dirty="0" smtClean="0"/>
+              <a:t>When you can say it like Shakespeare?</a:t>
+            </a:r>
+          </a:p>
+          <a:p>
+            <a:endParaRPr lang="en-US" dirty="0" smtClean="0"/>
+          </a:p>
+          <a:p>
+            <a:endParaRPr lang="en-US" dirty="0" smtClean="0"/>
+          </a:p>
+          <a:p>
+            <a:endParaRPr lang="en-US" dirty="0" smtClean="0"/>
+          </a:p>
+          <a:p>
+            <a:r>
+              <a:rPr lang="en-US" dirty="0" smtClean="0"/>
+              <a:t>Or its coder friendly version?</a:t>
+            </a:r>
+          </a:p>
+        </p:txBody>
+      </p:sp>
+      <p:sp>
+        <p:nvSpPr>
+          <p:cNvPr id="4" name="Rectangle 3"/>
+          <p:cNvSpPr/>
+          <p:nvPr/>
+        </p:nvSpPr>
+        <p:spPr>
+          <a:xfrm>
+            <a:off x="964096" y="2216786"/>
+            <a:ext cx="5317435" cy="747524"/>
+          </a:xfrm>
+          <a:prstGeom prst="rect">
+            <a:avLst/>
+          </a:prstGeom>
+          <a:solidFill>
+            <a:srgbClr val="FFC000"/>
+          </a:solidFill>
+          <a:ln>
+            <a:noFill/>
+          </a:ln>
+        </p:spPr>
+        <p:style>
+          <a:lnRef idx="1">
+            <a:schemeClr val="accent6"/>
+          </a:lnRef>
+          <a:fillRef idx="3">
+            <a:schemeClr val="accent6"/>
+          </a:fillRef>
+          <a:effectRef idx="2">
+            <a:schemeClr val="accent6"/>
+          </a:effectRef>
+          <a:fontRef idx="minor">
+            <a:schemeClr val="lt1"/>
+          </a:fontRef>
+        </p:style>
+        <p:txBody>
+          <a:bodyPr rtlCol="0" anchor="ctr"/>
+          <a:lstStyle/>
+          <a:p>
+            <a:pPr algn="ctr"/>
+            <a:r>
+              <a:rPr lang="de-DE" dirty="0" smtClean="0"/>
+              <a:t> </a:t>
+            </a:r>
+            <a:r>
+              <a:rPr lang="de-DE" b="1" dirty="0" smtClean="0">
+                <a:ln w="12700">
+                  <a:noFill/>
+                  <a:prstDash val="solid"/>
+                </a:ln>
+                <a:solidFill>
+                  <a:schemeClr val="tx2"/>
+                </a:solidFill>
+                <a:effectLst>
+                  <a:outerShdw blurRad="41275" dist="20320" dir="1800000" algn="tl" rotWithShape="0">
+                    <a:srgbClr val="000000">
+                      <a:alpha val="40000"/>
+                    </a:srgbClr>
+                  </a:outerShdw>
+                </a:effectLst>
+              </a:rPr>
+              <a:t>[A-Z0-9._%+-]+@[A-Z0-9.-]+\.[A-Z]{2,4}</a:t>
+            </a:r>
+          </a:p>
+        </p:txBody>
+      </p:sp>
+      <p:sp>
+        <p:nvSpPr>
+          <p:cNvPr id="6" name="Rectangle 5"/>
+          <p:cNvSpPr/>
+          <p:nvPr/>
+        </p:nvSpPr>
+        <p:spPr>
+          <a:xfrm>
+            <a:off x="964096" y="6033052"/>
+            <a:ext cx="7633252" cy="1093303"/>
+          </a:xfrm>
+          <a:prstGeom prst="rect">
+            <a:avLst/>
+          </a:prstGeom>
+          <a:solidFill>
+            <a:srgbClr val="FFC000"/>
+          </a:solidFill>
+          <a:ln>
+            <a:noFill/>
+          </a:ln>
+        </p:spPr>
+        <p:style>
+          <a:lnRef idx="1">
+            <a:schemeClr val="accent6"/>
+          </a:lnRef>
+          <a:fillRef idx="3">
+            <a:schemeClr val="accent6"/>
+          </a:fillRef>
+          <a:effectRef idx="2">
+            <a:schemeClr val="accent6"/>
+          </a:effectRef>
+          <a:fontRef idx="minor">
+            <a:schemeClr val="lt1"/>
+          </a:fontRef>
+        </p:style>
+        <p:txBody>
+          <a:bodyPr rtlCol="0" anchor="ctr"/>
+          <a:lstStyle/>
+          <a:p>
+            <a:pPr lvl="1"/>
+            <a:r>
+              <a:rPr lang="en-US" b="1" dirty="0" err="1" smtClean="0">
+                <a:ln w="12700">
+                  <a:noFill/>
+                  <a:prstDash val="solid"/>
+                </a:ln>
+                <a:solidFill>
+                  <a:schemeClr val="tx2"/>
+                </a:solidFill>
+                <a:effectLst>
+                  <a:outerShdw blurRad="41275" dist="20320" dir="1800000" algn="tl" rotWithShape="0">
+                    <a:srgbClr val="000000">
+                      <a:alpha val="40000"/>
+                    </a:srgbClr>
+                  </a:outerShdw>
+                </a:effectLst>
+              </a:rPr>
+              <a:t>Thou.shallmatch</a:t>
+            </a:r>
+            <a:r>
+              <a:rPr lang="en-US" b="1" dirty="0" smtClean="0">
+                <a:ln w="12700">
+                  <a:noFill/>
+                  <a:prstDash val="solid"/>
+                </a:ln>
+                <a:solidFill>
+                  <a:schemeClr val="tx2"/>
+                </a:solidFill>
+                <a:effectLst>
+                  <a:outerShdw blurRad="41275" dist="20320" dir="1800000" algn="tl" rotWithShape="0">
+                    <a:srgbClr val="000000">
+                      <a:alpha val="40000"/>
+                    </a:srgbClr>
+                  </a:outerShdw>
+                </a:effectLst>
+              </a:rPr>
+              <a:t>(a-string-of-letters</a:t>
+            </a:r>
+            <a:r>
+              <a:rPr lang="en-US" b="1" dirty="0" smtClean="0">
+                <a:ln w="12700">
+                  <a:noFill/>
+                  <a:prstDash val="solid"/>
+                </a:ln>
+                <a:solidFill>
+                  <a:schemeClr val="tx2"/>
+                </a:solidFill>
+                <a:effectLst>
+                  <a:outerShdw blurRad="41275" dist="20320" dir="1800000" algn="tl" rotWithShape="0">
+                    <a:srgbClr val="000000">
+                      <a:alpha val="40000"/>
+                    </a:srgbClr>
+                  </a:outerShdw>
+                </a:effectLst>
+              </a:rPr>
+              <a:t>)</a:t>
+            </a:r>
+          </a:p>
+          <a:p>
+            <a:pPr lvl="1"/>
+            <a:r>
+              <a:rPr lang="en-US" b="1" dirty="0" smtClean="0">
+                <a:ln w="12700">
+                  <a:noFill/>
+                  <a:prstDash val="solid"/>
+                </a:ln>
+                <a:solidFill>
+                  <a:schemeClr val="tx2"/>
+                </a:solidFill>
+                <a:effectLst>
+                  <a:outerShdw blurRad="41275" dist="20320" dir="1800000" algn="tl" rotWithShape="0">
+                    <a:srgbClr val="000000">
+                      <a:alpha val="40000"/>
+                    </a:srgbClr>
+                  </a:outerShdw>
+                </a:effectLst>
+              </a:rPr>
+              <a:t>		.</a:t>
+            </a:r>
+            <a:r>
+              <a:rPr lang="en-US" b="1" dirty="0" err="1" smtClean="0">
+                <a:ln w="12700">
+                  <a:noFill/>
+                  <a:prstDash val="solid"/>
+                </a:ln>
+                <a:solidFill>
+                  <a:schemeClr val="tx2"/>
+                </a:solidFill>
+                <a:effectLst>
+                  <a:outerShdw blurRad="41275" dist="20320" dir="1800000" algn="tl" rotWithShape="0">
+                    <a:srgbClr val="000000">
+                      <a:alpha val="40000"/>
+                    </a:srgbClr>
+                  </a:outerShdw>
+                </a:effectLst>
+              </a:rPr>
+              <a:t>followdby</a:t>
+            </a:r>
+            <a:r>
+              <a:rPr lang="en-US" b="1" dirty="0" smtClean="0">
+                <a:ln w="12700">
+                  <a:noFill/>
+                  <a:prstDash val="solid"/>
+                </a:ln>
+                <a:solidFill>
+                  <a:schemeClr val="tx2"/>
+                </a:solidFill>
+                <a:effectLst>
+                  <a:outerShdw blurRad="41275" dist="20320" dir="1800000" algn="tl" rotWithShape="0">
+                    <a:srgbClr val="000000">
+                      <a:alpha val="40000"/>
+                    </a:srgbClr>
+                  </a:outerShdw>
+                </a:effectLst>
+              </a:rPr>
+              <a:t>(@).</a:t>
+            </a:r>
+            <a:r>
+              <a:rPr lang="en-US" b="1" dirty="0" err="1" smtClean="0">
+                <a:ln w="12700">
+                  <a:noFill/>
+                  <a:prstDash val="solid"/>
+                </a:ln>
+                <a:solidFill>
+                  <a:schemeClr val="tx2"/>
+                </a:solidFill>
+                <a:effectLst>
+                  <a:outerShdw blurRad="41275" dist="20320" dir="1800000" algn="tl" rotWithShape="0">
+                    <a:srgbClr val="000000">
+                      <a:alpha val="40000"/>
+                    </a:srgbClr>
+                  </a:outerShdw>
+                </a:effectLst>
+              </a:rPr>
+              <a:t>then.someothercharacters</a:t>
+            </a:r>
+            <a:r>
+              <a:rPr lang="en-US" b="1" dirty="0" smtClean="0">
+                <a:ln w="12700">
+                  <a:noFill/>
+                  <a:prstDash val="solid"/>
+                </a:ln>
+                <a:solidFill>
+                  <a:schemeClr val="tx2"/>
+                </a:solidFill>
+                <a:effectLst>
+                  <a:outerShdw blurRad="41275" dist="20320" dir="1800000" algn="tl" rotWithShape="0">
+                    <a:srgbClr val="000000">
+                      <a:alpha val="40000"/>
+                    </a:srgbClr>
+                  </a:outerShdw>
+                </a:effectLst>
+              </a:rPr>
+              <a:t>()</a:t>
+            </a:r>
+          </a:p>
+          <a:p>
+            <a:pPr lvl="1"/>
+            <a:r>
+              <a:rPr lang="en-US" b="1" dirty="0" smtClean="0">
+                <a:ln w="12700">
+                  <a:noFill/>
+                  <a:prstDash val="solid"/>
+                </a:ln>
+                <a:solidFill>
+                  <a:schemeClr val="tx2"/>
+                </a:solidFill>
+                <a:effectLst>
+                  <a:outerShdw blurRad="41275" dist="20320" dir="1800000" algn="tl" rotWithShape="0">
+                    <a:srgbClr val="000000">
+                      <a:alpha val="40000"/>
+                    </a:srgbClr>
+                  </a:outerShdw>
+                </a:effectLst>
+              </a:rPr>
+              <a:t>		.</a:t>
+            </a:r>
+            <a:r>
+              <a:rPr lang="en-US" b="1" dirty="0" err="1" smtClean="0">
+                <a:ln w="12700">
+                  <a:noFill/>
+                  <a:prstDash val="solid"/>
+                </a:ln>
+                <a:solidFill>
+                  <a:schemeClr val="tx2"/>
+                </a:solidFill>
+                <a:effectLst>
+                  <a:outerShdw blurRad="41275" dist="20320" dir="1800000" algn="tl" rotWithShape="0">
+                    <a:srgbClr val="000000">
+                      <a:alpha val="40000"/>
+                    </a:srgbClr>
+                  </a:outerShdw>
+                </a:effectLst>
+              </a:rPr>
+              <a:t>adram</a:t>
+            </a:r>
+            <a:r>
+              <a:rPr lang="en-US" b="1" dirty="0" smtClean="0">
+                <a:ln w="12700">
+                  <a:noFill/>
+                  <a:prstDash val="solid"/>
+                </a:ln>
+                <a:solidFill>
+                  <a:schemeClr val="tx2"/>
+                </a:solidFill>
+                <a:effectLst>
+                  <a:outerShdw blurRad="41275" dist="20320" dir="1800000" algn="tl" rotWithShape="0">
+                    <a:srgbClr val="000000">
+                      <a:alpha val="40000"/>
+                    </a:srgbClr>
+                  </a:outerShdw>
+                </a:effectLst>
+              </a:rPr>
+              <a:t>(dot).</a:t>
+            </a:r>
+            <a:r>
+              <a:rPr lang="en-US" b="1" dirty="0" err="1" smtClean="0">
+                <a:ln w="12700">
+                  <a:noFill/>
+                  <a:prstDash val="solid"/>
+                </a:ln>
+                <a:solidFill>
+                  <a:schemeClr val="tx2"/>
+                </a:solidFill>
+                <a:effectLst>
+                  <a:outerShdw blurRad="41275" dist="20320" dir="1800000" algn="tl" rotWithShape="0">
+                    <a:srgbClr val="000000">
+                      <a:alpha val="40000"/>
+                    </a:srgbClr>
+                  </a:outerShdw>
+                </a:effectLst>
+              </a:rPr>
+              <a:t>and.some</a:t>
+            </a:r>
+            <a:r>
+              <a:rPr lang="en-US" b="1" dirty="0" smtClean="0">
+                <a:ln w="12700">
+                  <a:noFill/>
+                  <a:prstDash val="solid"/>
+                </a:ln>
+                <a:solidFill>
+                  <a:schemeClr val="tx2"/>
+                </a:solidFill>
+                <a:effectLst>
+                  <a:outerShdw blurRad="41275" dist="20320" dir="1800000" algn="tl" rotWithShape="0">
+                    <a:srgbClr val="000000">
+                      <a:alpha val="40000"/>
+                    </a:srgbClr>
+                  </a:outerShdw>
+                </a:effectLst>
+              </a:rPr>
+              <a:t>(</a:t>
+            </a:r>
+            <a:r>
+              <a:rPr lang="en-US" b="1" dirty="0" err="1" smtClean="0">
+                <a:ln w="12700">
+                  <a:noFill/>
+                  <a:prstDash val="solid"/>
+                </a:ln>
+                <a:solidFill>
+                  <a:schemeClr val="tx2"/>
+                </a:solidFill>
+                <a:effectLst>
+                  <a:outerShdw blurRad="41275" dist="20320" dir="1800000" algn="tl" rotWithShape="0">
+                    <a:srgbClr val="000000">
+                      <a:alpha val="40000"/>
+                    </a:srgbClr>
+                  </a:outerShdw>
+                </a:effectLst>
+              </a:rPr>
+              <a:t>moostuff</a:t>
+            </a:r>
+            <a:r>
+              <a:rPr lang="en-US" b="1" dirty="0" smtClean="0">
+                <a:ln w="12700">
+                  <a:noFill/>
+                  <a:prstDash val="solid"/>
+                </a:ln>
+                <a:solidFill>
+                  <a:schemeClr val="tx2"/>
+                </a:solidFill>
+                <a:effectLst>
+                  <a:outerShdw blurRad="41275" dist="20320" dir="1800000" algn="tl" rotWithShape="0">
+                    <a:srgbClr val="000000">
+                      <a:alpha val="40000"/>
+                    </a:srgbClr>
+                  </a:outerShdw>
+                </a:effectLst>
+              </a:rPr>
+              <a:t>);</a:t>
+            </a:r>
+            <a:endParaRPr lang="en-US" b="1" dirty="0" smtClean="0">
+              <a:ln w="12700">
+                <a:noFill/>
+                <a:prstDash val="solid"/>
+              </a:ln>
+              <a:solidFill>
+                <a:schemeClr val="tx2"/>
+              </a:solidFill>
+              <a:effectLst>
+                <a:outerShdw blurRad="41275" dist="20320" dir="1800000" algn="tl" rotWithShape="0">
+                  <a:srgbClr val="000000">
+                    <a:alpha val="40000"/>
+                  </a:srgbClr>
+                </a:outerShdw>
+              </a:effectLst>
+            </a:endParaRPr>
+          </a:p>
+        </p:txBody>
+      </p:sp>
+      <p:pic>
+        <p:nvPicPr>
+          <p:cNvPr id="6148" name="Picture 4" descr="http://thisaintevenfunny.files.wordpress.com/2012/07/1-shakespeare.jpeg"/>
+          <p:cNvPicPr>
+            <a:picLocks noChangeAspect="1" noChangeArrowheads="1"/>
+          </p:cNvPicPr>
+          <p:nvPr/>
+        </p:nvPicPr>
+        <p:blipFill>
+          <a:blip r:embed="rId2"/>
+          <a:srcRect/>
+          <a:stretch>
+            <a:fillRect/>
+          </a:stretch>
+        </p:blipFill>
+        <p:spPr bwMode="auto">
+          <a:xfrm>
+            <a:off x="6910787" y="1378333"/>
+            <a:ext cx="3077212" cy="2104077"/>
+          </a:xfrm>
+          <a:prstGeom prst="rect">
+            <a:avLst/>
+          </a:prstGeom>
+          <a:noFill/>
+        </p:spPr>
+      </p:pic>
+      <p:sp>
+        <p:nvSpPr>
+          <p:cNvPr id="10" name="Rectangle 9"/>
+          <p:cNvSpPr/>
+          <p:nvPr/>
+        </p:nvSpPr>
+        <p:spPr>
+          <a:xfrm>
+            <a:off x="964096" y="3850426"/>
+            <a:ext cx="7633252" cy="1330501"/>
+          </a:xfrm>
+          <a:prstGeom prst="rect">
+            <a:avLst/>
+          </a:prstGeom>
+          <a:solidFill>
+            <a:srgbClr val="FFC000"/>
+          </a:solidFill>
+          <a:ln>
+            <a:noFill/>
+          </a:ln>
+        </p:spPr>
+        <p:style>
+          <a:lnRef idx="1">
+            <a:schemeClr val="accent6"/>
+          </a:lnRef>
+          <a:fillRef idx="3">
+            <a:schemeClr val="accent6"/>
+          </a:fillRef>
+          <a:effectRef idx="2">
+            <a:schemeClr val="accent6"/>
+          </a:effectRef>
+          <a:fontRef idx="minor">
+            <a:schemeClr val="lt1"/>
+          </a:fontRef>
+        </p:style>
+        <p:txBody>
+          <a:bodyPr rtlCol="0" anchor="ctr"/>
+          <a:lstStyle/>
+          <a:p>
+            <a:pPr lvl="1"/>
+            <a:r>
+              <a:rPr lang="en-US" b="1" dirty="0" smtClean="0">
+                <a:ln w="12700">
+                  <a:noFill/>
+                  <a:prstDash val="solid"/>
+                </a:ln>
+                <a:solidFill>
+                  <a:schemeClr val="tx2"/>
+                </a:solidFill>
+                <a:effectLst>
+                  <a:outerShdw blurRad="41275" dist="20320" dir="1800000" algn="tl" rotWithShape="0">
+                    <a:srgbClr val="000000">
+                      <a:alpha val="40000"/>
+                    </a:srgbClr>
+                  </a:outerShdw>
+                </a:effectLst>
+              </a:rPr>
+              <a:t>“</a:t>
+            </a:r>
+            <a:r>
+              <a:rPr lang="en-US" b="1" dirty="0" smtClean="0">
+                <a:ln w="12700">
+                  <a:noFill/>
+                  <a:prstDash val="solid"/>
+                </a:ln>
+                <a:solidFill>
+                  <a:schemeClr val="tx2"/>
+                </a:solidFill>
+                <a:effectLst>
+                  <a:outerShdw blurRad="41275" dist="20320" dir="1800000" algn="tl" rotWithShape="0">
+                    <a:srgbClr val="000000">
+                      <a:alpha val="40000"/>
+                    </a:srgbClr>
+                  </a:outerShdw>
+                </a:effectLst>
+              </a:rPr>
+              <a:t>Thou shall match a string of letters </a:t>
+            </a:r>
+            <a:r>
+              <a:rPr lang="en-US" b="1" dirty="0" err="1" smtClean="0">
+                <a:ln w="12700">
+                  <a:noFill/>
+                  <a:prstDash val="solid"/>
+                </a:ln>
+                <a:solidFill>
+                  <a:schemeClr val="tx2"/>
+                </a:solidFill>
+                <a:effectLst>
+                  <a:outerShdw blurRad="41275" dist="20320" dir="1800000" algn="tl" rotWithShape="0">
+                    <a:srgbClr val="000000">
+                      <a:alpha val="40000"/>
+                    </a:srgbClr>
+                  </a:outerShdw>
+                </a:effectLst>
+              </a:rPr>
+              <a:t>follow'd</a:t>
+            </a:r>
+            <a:r>
+              <a:rPr lang="en-US" b="1" dirty="0" smtClean="0">
+                <a:ln w="12700">
+                  <a:noFill/>
+                  <a:prstDash val="solid"/>
+                </a:ln>
+                <a:solidFill>
+                  <a:schemeClr val="tx2"/>
+                </a:solidFill>
+                <a:effectLst>
+                  <a:outerShdw blurRad="41275" dist="20320" dir="1800000" algn="tl" rotWithShape="0">
+                    <a:srgbClr val="000000">
+                      <a:alpha val="40000"/>
+                    </a:srgbClr>
+                  </a:outerShdw>
+                </a:effectLst>
+              </a:rPr>
+              <a:t> by @ then some other characters, a dram dot and some moo stuff</a:t>
+            </a:r>
+            <a:r>
+              <a:rPr lang="en-US" b="1" dirty="0" smtClean="0">
+                <a:ln w="12700">
+                  <a:noFill/>
+                  <a:prstDash val="solid"/>
+                </a:ln>
+                <a:solidFill>
+                  <a:schemeClr val="tx2"/>
+                </a:solidFill>
+                <a:effectLst>
+                  <a:outerShdw blurRad="41275" dist="20320" dir="1800000" algn="tl" rotWithShape="0">
+                    <a:srgbClr val="000000">
+                      <a:alpha val="40000"/>
+                    </a:srgbClr>
+                  </a:outerShdw>
+                </a:effectLst>
+              </a:rPr>
+              <a:t>”</a:t>
+            </a:r>
+          </a:p>
+        </p:txBody>
+      </p:sp>
+    </p:spTree>
+  </p:cSld>
+  <p:clrMapOvr>
+    <a:masterClrMapping/>
+  </p:clrMapOvr>
+  <p:timing>
+    <p:tnLst>
+      <p:par>
+        <p:cTn id="1" dur="indefinite" restart="never" nodeType="tmRoot"/>
+      </p:par>
+    </p:tnLst>
+  </p:timing>
+</p:sld>
+</file>
+
+<file path=ppt/slides/slide3.xml><?xml version="1.0" encoding="utf-8"?>
+<p:sld xmlns:a="http://schemas.openxmlformats.org/drawingml/2006/main" xmlns:r="http://schemas.openxmlformats.org/officeDocument/2006/relationships" xmlns:p="http://schemas.openxmlformats.org/presentationml/2006/main">
+  <p:cSld>
+    <p:spTree>
+      <p:nvGrpSpPr>
+        <p:cNvPr id="1" name=""/>
+        <p:cNvGrpSpPr/>
+        <p:nvPr/>
+      </p:nvGrpSpPr>
+      <p:grpSpPr>
+        <a:xfrm>
+          <a:off x="0" y="0"/>
+          <a:ext cx="0" cy="0"/>
+          <a:chOff x="0" y="0"/>
+          <a:chExt cx="0" cy="0"/>
+        </a:xfrm>
+      </p:grpSpPr>
+      <p:sp>
+        <p:nvSpPr>
+          <p:cNvPr id="2" name="Titre 1"/>
+          <p:cNvSpPr>
+            <a:spLocks noGrp="1"/>
+          </p:cNvSpPr>
+          <p:nvPr>
+            <p:ph type="title"/>
+          </p:nvPr>
+        </p:nvSpPr>
+        <p:spPr/>
+        <p:txBody>
+          <a:bodyPr/>
+          <a:lstStyle/>
+          <a:p>
+            <a:r>
+              <a:rPr lang="en-US" dirty="0" smtClean="0"/>
+              <a:t>A regular expression DSL?</a:t>
+            </a:r>
+            <a:endParaRPr lang="de-DE" dirty="0"/>
+          </a:p>
+        </p:txBody>
+      </p:sp>
+      <p:sp>
+        <p:nvSpPr>
+          <p:cNvPr id="3" name="Espace réservé du contenu 2"/>
+          <p:cNvSpPr>
+            <a:spLocks noGrp="1"/>
+          </p:cNvSpPr>
+          <p:nvPr>
+            <p:ph idx="1"/>
+          </p:nvPr>
+        </p:nvSpPr>
+        <p:spPr/>
+        <p:txBody>
+          <a:bodyPr/>
+          <a:lstStyle/>
+          <a:p>
+            <a:r>
+              <a:rPr lang="en-US" dirty="0" smtClean="0"/>
+              <a:t>Can it help write </a:t>
+            </a:r>
+            <a:r>
+              <a:rPr lang="en-US" dirty="0" err="1" smtClean="0"/>
+              <a:t>Regexes</a:t>
+            </a:r>
+            <a:r>
+              <a:rPr lang="en-US" dirty="0" smtClean="0"/>
+              <a:t>?</a:t>
+            </a:r>
+          </a:p>
+          <a:p>
+            <a:r>
+              <a:rPr lang="en-US" dirty="0" smtClean="0"/>
+              <a:t>Can it help </a:t>
+            </a:r>
+            <a:r>
+              <a:rPr lang="en-US" smtClean="0"/>
+              <a:t>understand them?</a:t>
+            </a:r>
+            <a:endParaRPr lang="en-US" dirty="0" smtClean="0"/>
+          </a:p>
+        </p:txBody>
+      </p:sp>
+    </p:spTree>
+  </p:cSld>
+  <p:clrMapOvr>
+    <a:masterClrMapping/>
+  </p:clrMapOvr>
+</p:sld>
+</file>
+
+<file path=ppt/slides/slide4.xml><?xml version="1.0" encoding="utf-8"?>
+<p:sld xmlns:a="http://schemas.openxmlformats.org/drawingml/2006/main" xmlns:r="http://schemas.openxmlformats.org/officeDocument/2006/relationships" xmlns:p="http://schemas.openxmlformats.org/presentationml/2006/main">
+  <p:cSld>
+    <p:spTree>
+      <p:nvGrpSpPr>
+        <p:cNvPr id="1" name=""/>
+        <p:cNvGrpSpPr/>
+        <p:nvPr/>
+      </p:nvGrpSpPr>
+      <p:grpSpPr>
+        <a:xfrm>
+          <a:off x="0" y="0"/>
+          <a:ext cx="0" cy="0"/>
+          <a:chOff x="0" y="0"/>
+          <a:chExt cx="0" cy="0"/>
+        </a:xfrm>
+      </p:grpSpPr>
+      <p:sp>
+        <p:nvSpPr>
+          <p:cNvPr id="6146" name="Titel 1"/>
+          <p:cNvSpPr>
+            <a:spLocks noGrp="1"/>
+          </p:cNvSpPr>
+          <p:nvPr>
+            <p:ph type="title"/>
+          </p:nvPr>
+        </p:nvSpPr>
+        <p:spPr/>
+        <p:txBody>
+          <a:bodyPr/>
+          <a:lstStyle/>
+          <a:p>
+            <a:pPr eaLnBrk="1" hangingPunct="1"/>
+            <a:r>
+              <a:rPr lang="de-DE" dirty="0" err="1" smtClean="0">
+                <a:latin typeface="Arial" charset="0"/>
+                <a:ea typeface="ＭＳ Ｐゴシック" charset="0"/>
+              </a:rPr>
+              <a:t>Why</a:t>
+            </a:r>
+            <a:r>
+              <a:rPr lang="de-DE" dirty="0" smtClean="0">
+                <a:latin typeface="Arial" charset="0"/>
+                <a:ea typeface="ＭＳ Ｐゴシック" charset="0"/>
+              </a:rPr>
+              <a:t> a </a:t>
+            </a:r>
+            <a:r>
+              <a:rPr lang="de-DE" dirty="0" err="1" smtClean="0">
+                <a:latin typeface="Arial" charset="0"/>
+                <a:ea typeface="ＭＳ Ｐゴシック" charset="0"/>
+              </a:rPr>
+              <a:t>regular</a:t>
+            </a:r>
+            <a:r>
+              <a:rPr lang="de-DE" dirty="0" smtClean="0">
+                <a:latin typeface="Arial" charset="0"/>
+                <a:ea typeface="ＭＳ Ｐゴシック" charset="0"/>
+              </a:rPr>
+              <a:t> </a:t>
+            </a:r>
+            <a:r>
+              <a:rPr lang="de-DE" dirty="0" err="1" smtClean="0">
+                <a:latin typeface="Arial" charset="0"/>
+                <a:ea typeface="ＭＳ Ｐゴシック" charset="0"/>
+              </a:rPr>
+              <a:t>e</a:t>
+            </a:r>
+            <a:r>
+              <a:rPr lang="de-DE" dirty="0" err="1" smtClean="0">
+                <a:latin typeface="Arial" charset="0"/>
+                <a:ea typeface="ＭＳ Ｐゴシック" charset="0"/>
+              </a:rPr>
+              <a:t>xpression</a:t>
+            </a:r>
+            <a:r>
+              <a:rPr lang="de-DE" dirty="0" smtClean="0">
+                <a:latin typeface="Arial" charset="0"/>
+                <a:ea typeface="ＭＳ Ｐゴシック" charset="0"/>
+              </a:rPr>
+              <a:t> DSL?</a:t>
+            </a:r>
+            <a:endParaRPr lang="de-DE" dirty="0">
+              <a:latin typeface="Arial" charset="0"/>
+              <a:ea typeface="ＭＳ Ｐゴシック" charset="0"/>
+            </a:endParaRPr>
           </a:p>
         </p:txBody>
       </p:sp>
@@ -1915,128 +3182,673 @@
           <a:bodyPr/>
           <a:lstStyle/>
           <a:p>
+            <a:r>
+              <a:rPr lang="en-US" dirty="0" smtClean="0"/>
+              <a:t>C# ‘dynamic’ talk example</a:t>
+            </a:r>
+          </a:p>
+          <a:p>
+            <a:r>
+              <a:rPr lang="en-US" dirty="0" smtClean="0"/>
+              <a:t>Having </a:t>
+            </a:r>
+            <a:r>
+              <a:rPr lang="en-US" dirty="0" smtClean="0"/>
+              <a:t>written </a:t>
+            </a:r>
+            <a:r>
+              <a:rPr lang="en-US" dirty="0" smtClean="0"/>
+              <a:t>a real </a:t>
+            </a:r>
+            <a:r>
+              <a:rPr lang="en-US" dirty="0" smtClean="0"/>
+              <a:t>DSL (at least) </a:t>
+            </a:r>
+            <a:r>
+              <a:rPr lang="en-US" dirty="0" smtClean="0"/>
+              <a:t>once</a:t>
+            </a:r>
+          </a:p>
+          <a:p>
+            <a:r>
+              <a:rPr lang="en-US" dirty="0" smtClean="0"/>
+              <a:t>See if it works</a:t>
+            </a:r>
+            <a:endParaRPr lang="en-US" dirty="0" smtClean="0"/>
+          </a:p>
+          <a:p>
+            <a:endParaRPr lang="en-US" dirty="0" smtClean="0"/>
+          </a:p>
+          <a:p>
+            <a:r>
+              <a:rPr lang="en-US" dirty="0" smtClean="0"/>
+              <a:t>Regular Expression knowledge refresh</a:t>
+            </a:r>
+          </a:p>
+          <a:p>
+            <a:endParaRPr lang="en-US" dirty="0" smtClean="0"/>
+          </a:p>
+          <a:p>
+            <a:r>
+              <a:rPr lang="en-US" strike="sngStrike" dirty="0" smtClean="0"/>
+              <a:t>Get rich and famous (bitches!)</a:t>
+            </a:r>
+          </a:p>
+          <a:p>
+            <a:r>
+              <a:rPr lang="en-US" b="1" dirty="0" smtClean="0"/>
+              <a:t>Because I can!</a:t>
+            </a:r>
+          </a:p>
+        </p:txBody>
+      </p:sp>
+      <p:pic>
+        <p:nvPicPr>
+          <p:cNvPr id="3074" name="Picture 2" descr="http://blogmedia.eventbrite.com/wp-content/uploads/Priority-7.27.11.jpg"/>
+          <p:cNvPicPr>
+            <a:picLocks noChangeAspect="1" noChangeArrowheads="1"/>
+          </p:cNvPicPr>
+          <p:nvPr/>
+        </p:nvPicPr>
+        <p:blipFill>
+          <a:blip r:embed="rId2"/>
+          <a:srcRect/>
+          <a:stretch>
+            <a:fillRect/>
+          </a:stretch>
+        </p:blipFill>
+        <p:spPr bwMode="auto">
+          <a:xfrm>
+            <a:off x="6647082" y="1595592"/>
+            <a:ext cx="2987027" cy="2246244"/>
+          </a:xfrm>
+          <a:prstGeom prst="rect">
+            <a:avLst/>
+          </a:prstGeom>
+          <a:noFill/>
+        </p:spPr>
+      </p:pic>
+      <p:pic>
+        <p:nvPicPr>
+          <p:cNvPr id="3076" name="Picture 4" descr="http://img.ibtimes.com/www/data/images/full/2013/09/26/412910.jpg"/>
+          <p:cNvPicPr>
+            <a:picLocks noChangeAspect="1" noChangeArrowheads="1"/>
+          </p:cNvPicPr>
+          <p:nvPr/>
+        </p:nvPicPr>
+        <p:blipFill>
+          <a:blip r:embed="rId3"/>
+          <a:srcRect/>
+          <a:stretch>
+            <a:fillRect/>
+          </a:stretch>
+        </p:blipFill>
+        <p:spPr bwMode="auto">
+          <a:xfrm>
+            <a:off x="6647083" y="4036924"/>
+            <a:ext cx="2987026" cy="2991908"/>
+          </a:xfrm>
+          <a:prstGeom prst="rect">
+            <a:avLst/>
+          </a:prstGeom>
+          <a:noFill/>
+        </p:spPr>
+      </p:pic>
+    </p:spTree>
+  </p:cSld>
+  <p:clrMapOvr>
+    <a:masterClrMapping/>
+  </p:clrMapOvr>
+  <p:timing>
+    <p:tnLst>
+      <p:par>
+        <p:cTn id="1" dur="indefinite" restart="never" nodeType="tmRoot"/>
+      </p:par>
+    </p:tnLst>
+  </p:timing>
+</p:sld>
+</file>
+
+<file path=ppt/slides/slide5.xml><?xml version="1.0" encoding="utf-8"?>
+<p:sld xmlns:a="http://schemas.openxmlformats.org/drawingml/2006/main" xmlns:r="http://schemas.openxmlformats.org/officeDocument/2006/relationships" xmlns:p="http://schemas.openxmlformats.org/presentationml/2006/main">
+  <p:cSld>
+    <p:spTree>
+      <p:nvGrpSpPr>
+        <p:cNvPr id="1" name=""/>
+        <p:cNvGrpSpPr/>
+        <p:nvPr/>
+      </p:nvGrpSpPr>
+      <p:grpSpPr>
+        <a:xfrm>
+          <a:off x="0" y="0"/>
+          <a:ext cx="0" cy="0"/>
+          <a:chOff x="0" y="0"/>
+          <a:chExt cx="0" cy="0"/>
+        </a:xfrm>
+      </p:grpSpPr>
+      <p:sp>
+        <p:nvSpPr>
+          <p:cNvPr id="2" name="Titre 1"/>
+          <p:cNvSpPr>
+            <a:spLocks noGrp="1"/>
+          </p:cNvSpPr>
+          <p:nvPr>
+            <p:ph type="title"/>
+          </p:nvPr>
+        </p:nvSpPr>
+        <p:spPr/>
+        <p:txBody>
+          <a:bodyPr/>
+          <a:lstStyle/>
+          <a:p>
+            <a:r>
+              <a:rPr lang="en-US" dirty="0" smtClean="0"/>
+              <a:t>What we’re </a:t>
+            </a:r>
+            <a:r>
+              <a:rPr lang="en-US" u="sng" dirty="0" smtClean="0"/>
+              <a:t>NOT</a:t>
+            </a:r>
+            <a:r>
+              <a:rPr lang="en-US" dirty="0" smtClean="0"/>
+              <a:t> talking about</a:t>
+            </a:r>
+            <a:endParaRPr lang="de-DE" dirty="0"/>
+          </a:p>
+        </p:txBody>
+      </p:sp>
+      <p:sp>
+        <p:nvSpPr>
+          <p:cNvPr id="3" name="Espace réservé du contenu 2"/>
+          <p:cNvSpPr>
+            <a:spLocks noGrp="1"/>
+          </p:cNvSpPr>
+          <p:nvPr>
+            <p:ph idx="1"/>
+          </p:nvPr>
+        </p:nvSpPr>
+        <p:spPr/>
+        <p:txBody>
+          <a:bodyPr/>
+          <a:lstStyle/>
+          <a:p>
+            <a:r>
+              <a:rPr lang="en-US" dirty="0" smtClean="0"/>
+              <a:t>How to write regular expressions</a:t>
+            </a:r>
+          </a:p>
+          <a:p>
+            <a:r>
+              <a:rPr lang="en-US" dirty="0" smtClean="0"/>
+              <a:t>Optimization &amp; Performance</a:t>
+            </a:r>
+          </a:p>
+          <a:p>
+            <a:r>
+              <a:rPr lang="en-US" dirty="0" smtClean="0"/>
+              <a:t>Devise on the RFC822 </a:t>
+            </a:r>
+            <a:r>
+              <a:rPr lang="en-US" dirty="0" err="1" smtClean="0"/>
+              <a:t>EMail</a:t>
+            </a:r>
+            <a:r>
+              <a:rPr lang="en-US" dirty="0" smtClean="0"/>
+              <a:t> Address </a:t>
+            </a:r>
+            <a:r>
+              <a:rPr lang="en-US" dirty="0" err="1" smtClean="0"/>
+              <a:t>Regex</a:t>
+            </a:r>
+            <a:r>
+              <a:rPr lang="en-US" dirty="0" smtClean="0"/>
+              <a:t>:</a:t>
+            </a:r>
+            <a:endParaRPr lang="de-DE" dirty="0"/>
+          </a:p>
+        </p:txBody>
+      </p:sp>
+      <p:pic>
+        <p:nvPicPr>
+          <p:cNvPr id="1025" name="Picture 1"/>
+          <p:cNvPicPr>
+            <a:picLocks noChangeAspect="1" noChangeArrowheads="1"/>
+          </p:cNvPicPr>
+          <p:nvPr/>
+        </p:nvPicPr>
+        <p:blipFill>
+          <a:blip r:embed="rId2"/>
+          <a:srcRect/>
+          <a:stretch>
+            <a:fillRect/>
+          </a:stretch>
+        </p:blipFill>
+        <p:spPr bwMode="auto">
+          <a:xfrm>
+            <a:off x="1709531" y="3392991"/>
+            <a:ext cx="6832116" cy="3615439"/>
+          </a:xfrm>
+          <a:prstGeom prst="rect">
+            <a:avLst/>
+          </a:prstGeom>
+          <a:noFill/>
+          <a:ln w="9525">
+            <a:noFill/>
+            <a:miter lim="800000"/>
+            <a:headEnd/>
+            <a:tailEnd/>
+          </a:ln>
+        </p:spPr>
+      </p:pic>
+    </p:spTree>
+  </p:cSld>
+  <p:clrMapOvr>
+    <a:masterClrMapping/>
+  </p:clrMapOvr>
+</p:sld>
+</file>
+
+<file path=ppt/slides/slide6.xml><?xml version="1.0" encoding="utf-8"?>
+<p:sld xmlns:a="http://schemas.openxmlformats.org/drawingml/2006/main" xmlns:r="http://schemas.openxmlformats.org/officeDocument/2006/relationships" xmlns:p="http://schemas.openxmlformats.org/presentationml/2006/main" show="0">
+  <p:cSld>
+    <p:spTree>
+      <p:nvGrpSpPr>
+        <p:cNvPr id="1" name=""/>
+        <p:cNvGrpSpPr/>
+        <p:nvPr/>
+      </p:nvGrpSpPr>
+      <p:grpSpPr>
+        <a:xfrm>
+          <a:off x="0" y="0"/>
+          <a:ext cx="0" cy="0"/>
+          <a:chOff x="0" y="0"/>
+          <a:chExt cx="0" cy="0"/>
+        </a:xfrm>
+      </p:grpSpPr>
+      <p:sp>
+        <p:nvSpPr>
+          <p:cNvPr id="2" name="Titre 1"/>
+          <p:cNvSpPr>
+            <a:spLocks noGrp="1"/>
+          </p:cNvSpPr>
+          <p:nvPr>
+            <p:ph type="title"/>
+          </p:nvPr>
+        </p:nvSpPr>
+        <p:spPr/>
+        <p:txBody>
+          <a:bodyPr/>
+          <a:lstStyle/>
+          <a:p>
+            <a:endParaRPr lang="de-DE" dirty="0"/>
+          </a:p>
+        </p:txBody>
+      </p:sp>
+      <p:sp>
+        <p:nvSpPr>
+          <p:cNvPr id="3" name="Espace réservé du contenu 2"/>
+          <p:cNvSpPr>
+            <a:spLocks noGrp="1"/>
+          </p:cNvSpPr>
+          <p:nvPr>
+            <p:ph idx="1"/>
+          </p:nvPr>
+        </p:nvSpPr>
+        <p:spPr/>
+        <p:txBody>
+          <a:bodyPr/>
+          <a:lstStyle/>
+          <a:p>
+            <a:endParaRPr lang="de-DE" dirty="0"/>
+          </a:p>
+        </p:txBody>
+      </p:sp>
+      <p:sp>
+        <p:nvSpPr>
+          <p:cNvPr id="4" name="Rectangle 3"/>
+          <p:cNvSpPr/>
+          <p:nvPr/>
+        </p:nvSpPr>
+        <p:spPr>
+          <a:xfrm>
+            <a:off x="1351722" y="2494722"/>
+            <a:ext cx="7484165" cy="3900897"/>
+          </a:xfrm>
+          <a:prstGeom prst="rect">
+            <a:avLst/>
+          </a:prstGeom>
+          <a:solidFill>
+            <a:srgbClr val="FFC000"/>
+          </a:solidFill>
+          <a:ln>
+            <a:noFill/>
+          </a:ln>
+        </p:spPr>
+        <p:style>
+          <a:lnRef idx="1">
+            <a:schemeClr val="accent6"/>
+          </a:lnRef>
+          <a:fillRef idx="3">
+            <a:schemeClr val="accent6"/>
+          </a:fillRef>
+          <a:effectRef idx="2">
+            <a:schemeClr val="accent6"/>
+          </a:effectRef>
+          <a:fontRef idx="minor">
+            <a:schemeClr val="lt1"/>
+          </a:fontRef>
+        </p:style>
+        <p:txBody>
+          <a:bodyPr rtlCol="0" anchor="ctr"/>
+          <a:lstStyle/>
+          <a:p>
+            <a:pPr algn="ctr"/>
+            <a:r>
+              <a:rPr lang="pt-BR" sz="700" b="1" dirty="0" smtClean="0">
+                <a:ln w="12700">
+                  <a:noFill/>
+                  <a:prstDash val="solid"/>
+                </a:ln>
+                <a:solidFill>
+                  <a:schemeClr val="tx2"/>
+                </a:solidFill>
+                <a:effectLst>
+                  <a:outerShdw blurRad="41275" dist="20320" dir="1800000" algn="tl" rotWithShape="0">
+                    <a:srgbClr val="000000">
+                      <a:alpha val="40000"/>
+                    </a:srgbClr>
+                  </a:outerShdw>
+                </a:effectLst>
+              </a:rPr>
+              <a:t>(?:(?:\r\n)?[ \t])*(?:(?:(?:[^()&lt;&gt;@,;:\\".\[\] \000-\031]+(?:(?:(?:\r\n)?[ \t] )+|\Z|(?=[\["()&lt;&gt;@,;:\\".\[\]]))|"(?:[^\"\r\\]|\\.|(?:(?:\r\n)?[ \t]))*"(?:(?: \r\n)?[ \t])*)(?:\.(?:(?:\r\n)?[ \t])*(?:[^()&lt;&gt;@,;:\\".\[\] \000-\031]+(?:(?:( ?:\r\n)?[ \t])+|\Z|(?=[\["()&lt;&gt;@,;:\\".\[\]]))|"(?:[^\"\r\\]|\\.|(?:(?:\r\n)?[ \t]))*"(?:(?:\r\n)?[ \t])*))*@(?:(?:\r\n)?[ \t])*(?:[^()&lt;&gt;@,;:\\".\[\] \000-\0 31]+(?:(?:(?:\r\n)?[ \t])+|\Z|(?=[\["()&lt;&gt;@,;:\\".\[\]]))|\[([^\[\]\r\\]|\\.)*\ ](?:(?:\r\n)?[ \t])*)(?:\.(?:(?:\r\n)?[ \t])*(?:[^()&lt;&gt;@,;:\\".\[\] \000-\031]+ (?:(?:(?:\r\n)?[ \t])+|\Z|(?=[\["()&lt;&gt;@,;:\\".\[\]]))|\[([^\[\]\r\\]|\\.)*\](?: (?:\r\n)?[ \t])*))*|(?:[^()&lt;&gt;@,;:\\".\[\] \000-\031]+(?:(?:(?:\r\n)?[ \t])+|\Z |(?=[\["()&lt;&gt;@,;:\\".\[\]]))|"(?:[^\"\r\\]|\\.|(?:(?:\r\n)?[ \t]))*"(?:(?:\r\n) ?[ \t])*)*\&lt;(?:(?:\r\n)?[ \t])*(?:@(?:[^()&lt;&gt;@,;:\\".\[\] \000-\031]+(?:(?:(?:\ r\n)?[ \t])+|\Z|(?=[\["()&lt;&gt;@,;:\\".\[\]]))|\[([^\[\]\r\\]|\\.)*\](?:(?:\r\n)?[ \t])*)(?:\.(?:(?:\r\n)?[ \t])*(?:[^()&lt;&gt;@,;:\\".\[\] \000-\031]+(?:(?:(?:\r\n) ?[ \t])+|\Z|(?=[\["()&lt;&gt;@,;:\\".\[\]]))|\[([^\[\]\r\\]|\\.)*\](?:(?:\r\n)?[ \t] )*))*(?:,@(?:(?:\r\n)?[ \t])*(?:[^()&lt;&gt;@,;:\\".\[\] \000-\031]+(?:(?:(?:\r\n)?[ \t])+|\Z|(?=[\["()&lt;&gt;@,;:\\".\[\]]))|\[([^\[\]\r\\]|\\.)*\](?:(?:\r\n)?[ \t])* )(?:\.(?:(?:\r\n)?[ \t])*(?:[^()&lt;&gt;@,;:\\".\[\] \000-\031]+(?:(?:(?:\r\n)?[ \t] )+|\Z|(?=[\["()&lt;&gt;@,;:\\".\[\]]))|\[([^\[\]\r\\]|\\.)*\](?:(?:\r\n)?[ \t])*))*) *:(?:(?:\r\n)?[ \t])*)?(?:[^()&lt;&gt;@,;:\\".\[\] \000-\031]+(?:(?:(?:\r\n)?[ \t])+ |\Z|(?=[\["()&lt;&gt;@,;:\\".\[\]]))|"(?:[^\"\r\\]|\\.|(?:(?:\r\n)?[ \t]))*"(?:(?:\r \n)?[ \t])*)(?:\.(?:(?:\r\n)?[ \t])*(?:[^()&lt;&gt;@,;:\\".\[\] \000-\031]+(?:(?:(?: \r\n)?[ \t])+|\Z|(?=[\["()&lt;&gt;@,;:\\".\[\]]))|"(?:[^\"\r\\]|\\.|(?:(?:\r\n)?[ \t ]))*"(?:(?:\r\n)?[ \t])*))*@(?:(?:\r\n)?[ \t])*(?:[^()&lt;&gt;@,;:\\".\[\] \000-\031 ]+(?:(?:(?:\r\n)?[ \t])+|\Z|(?=[\["()&lt;&gt;@,;:\\".\[\]]))|\[([^\[\]\r\\]|\\.)*\]( ?:(?:\r\n)?[ \t])*)(?:\.(?:(?:\r\n)?[ \t])*(?:[^()&lt;&gt;@,;:\\".\[\] \000-\031]+(? :(?:(?:\r\n)?[ \t])+|\Z|(?=[\["()&lt;&gt;@,;:\\".\[\]]))|\[([^\[\]\r\\]|\\.)*\](?:(? :\r\n)?[ \t])*))*\&gt;(?:(?:\r\n)?[ \t])*)|(?:[^()&lt;&gt;@,;:\\".\[\] \000-\031]+(?:(? :(?:\r\n)?[ \t])+|\Z|(?=[\["()&lt;&gt;@,;:\\".\[\]]))|"(?:[^\"\r\\]|\\.|(?:(?:\r\n)? [ \t]))*"(?:(?:\r\n)?[ \t])*)*:(?:(?:\r\n)?[ \t])*(?:(?:(?:[^()&lt;&gt;@,;:\\".\[\] \000-\031]+(?:(?:(?:\r\n)?[ \t])+|\Z|(?=[\["()&lt;&gt;@,;:\\".\[\]]))|"(?:[^\"\r\\]| \\.|(?:(?:\r\n)?[ \t]))*"(?:(?:\r\n)?[ \t])*)(?:\.(?:(?:\r\n)?[ \t])*(?:[^()&lt;&gt; @,;:\\".\[\] \000-\031]+(?:(?:(?:\r\n)?[ \t])+|\Z|(?=[\["()&lt;&gt;@,;:\\".\[\]]))|" (?:[^\"\r\\]|\\.|(?:(?:\r\n)?[ \t]))*"(?:(?:\r\n)?[ \t])*))*@(?:(?:\r\n)?[ \t] )*(?:[^()&lt;&gt;@,;:\\".\[\] \000-\031]+(?:(?:(?:\r\n)?[ \t])+|\Z|(?=[\["()&lt;&gt;@,;:\\ ".\[\]]))|\[([^\[\]\r\\]|\\.)*\](?:(?:\r\n)?[ \t])*)(?:\.(?:(?:\r\n)?[ \t])*(? :[^()&lt;&gt;@,;:\\".\[\] \000-\031]+(?:(?:(?:\r\n)?[ \t])+|\Z|(?=[\["()&lt;&gt;@,;:\\".\[ \]]))|\[([^\[\]\r\\]|\\.)*\](?:(?:\r\n)?[ \t])*))*|(?:[^()&lt;&gt;@,;:\\".\[\] \000- \031]+(?:(?:(?:\r\n)?[ \t])+|\Z|(?=[\["()&lt;&gt;@,;:\\".\[\]]))|"(?:[^\"\r\\]|\\.|( ?:(?:\r\n)?[ \t]))*"(?:(?:\r\n)?[ \t])*)*\&lt;(?:(?:\r\n)?[ \t])*(?:@(?:[^()&lt;&gt;@,; :\\".\[\] \000-\031]+(?:(?:(?:\r\n)?[ \t])+|\Z|(?=[\["()&lt;&gt;@,;:\\".\[\]]))|\[([ ^\[\]\r\\]|\\.)*\](?:(?:\r\n)?[ \t])*)(?:\.(?:(?:\r\n)?[ \t])*(?:[^()&lt;&gt;@,;:\\" .\[\] \000-\031]+(?:(?:(?:\r\n)?[ \t])+|\Z|(?=[\["()&lt;&gt;@,;:\\".\[\]]))|\[([^\[\ ]\r\\]|\\.)*\](?:(?:\r\n)?[ \t])*))*(?:,@(?:(?:\r\n)?[ \t])*(?:[^()&lt;&gt;@,;:\\".\ [\] \000-\031]+(?:(?:(?:\r\n)?[ \t])+|\Z|(?=[\["()&lt;&gt;@,;:\\".\[\]]))|\[([^\[\]\ r\\]|\\.)*\](?:(?:\r\n)?[ \t])*)(?:\.(?:(?:\r\n)?[ \t])*(?:[^()&lt;&gt;@,;:\\".\[\] \000-\031]+(?:(?:(?:\r\n)?[ \t])+|\Z|(?=[\["()&lt;&gt;@,;:\\".\[\]]))|\[([^\[\]\r\\] |\\.)*\](?:(?:\r\n)?[ \t])*))*)*:(?:(?:\r\n)?[ \t])*)?(?:[^()&lt;&gt;@,;:\\".\[\] \0 00-\031]+(?:(?:(?:\r\n)?[ \t])+|\Z|(?=[\["()&lt;&gt;@,;:\\".\[\]]))|"(?:[^\"\r\\]|\\ .|(?:(?:\r\n)?[ \t]))*"(?:(?:\r\n)?[ \t])*)(?:\.(?:(?:\r\n)?[ \t])*(?:[^()&lt;&gt;@, ;:\\".\[\] \000-\031]+(?:(?:(?:\r\n)?[ \t])+|\Z|(?=[\["()&lt;&gt;@,;:\\".\[\]]))|"(? :[^\"\r\\]|\\.|(?:(?:\r\n)?[ \t]))*"(?:(?:\r\n)?[ \t])*))*@(?:(?:\r\n)?[ \t])* (?:[^()&lt;&gt;@,;:\\".\[\] \000-\031]+(?:(?:(?:\r\n)?[ \t])+|\Z|(?=[\["()&lt;&gt;@,;:\\". \[\]]))|\[([^\[\]\r\\]|\\.)*\](?:(?:\r\n)?[ \t])*)(?:\.(?:(?:\r\n)?[ \t])*(?:[ ^()&lt;&gt;@,;:\\".\[\] \000-\031]+(?:(?:(?:\r\n)?[ \t])+|\Z|(?=[\["()&lt;&gt;@,;:\\".\[\] ]))|\[([^\[\]\r\\]|\\.)*\](?:(?:\r\n)?[ \t])*))*\&gt;(?:(?:\r\n)?[ \t])*)(?:,\s*( ?:(?:[^()&lt;&gt;@,;:\\".\[\] \000-\031]+(?:(?:(?:\r\n)?[ \t])+|\Z|(?=[\["()&lt;&gt;@,;:\\ ".\[\]]))|"(?:[^\"\r\\]|\\.|(?:(?:\r\n)?[ \t]))*"(?:(?:\r\n)?[ \t])*)(?:\.(?:( ?:\r\n)?[ \t])*(?:[^()&lt;&gt;@,;:\\".\[\] \000-\031]+(?:(?:(?:\r\n)?[ \t])+|\Z|(?=[ \["()&lt;&gt;@,;:\\".\[\]]))|"(?:[^\"\r\\]|\\.|(?:(?:\r\n)?[ \t]))*"(?:(?:\r\n)?[ \t ])*))*@(?:(?:\r\n)?[ \t])*(?:[^()&lt;&gt;@,;:\\".\[\] \000-\031]+(?:(?:(?:\r\n)?[ \t ])+|\Z|(?=[\["()&lt;&gt;@,;:\\".\[\]]))|\[([^\[\]\r\\]|\\.)*\](?:(?:\r\n)?[ \t])*)(? :\.(?:(?:\r\n)?[ \t])*(?:[^()&lt;&gt;@,;:\\".\[\] \000-\031]+(?:(?:(?:\r\n)?[ \t])+| \Z|(?=[\["()&lt;&gt;@,;:\\".\[\]]))|\[([^\[\]\r\\]|\\.)*\](?:(?:\r\n)?[ \t])*))*|(?: [^()&lt;&gt;@,;:\\".\[\] \000-\031]+(?:(?:(?:\r\n)?[ \t])+|\Z|(?=[\["()&lt;&gt;@,;:\\".\[\ ]]))|"(?:[^\"\r\\]|\\.|(?:(?:\r\n)?[ \t]))*"(?:(?:\r\n)?[ \t])*)*\&lt;(?:(?:\r\n) ?[ \t])*(?:@(?:[^()&lt;&gt;@,;:\\".\[\] \000-\031]+(?:(?:(?:\r\n)?[ \t])+|\Z|(?=[\[" ()&lt;&gt;@,;:\\".\[\]]))|\[([^\[\]\r\\]|\\.)*\](?:(?:\r\n)?[ \t])*)(?:\.(?:(?:\r\n) ?[ \t])*(?:[^()&lt;&gt;@,;:\\".\[\] \000-\031]+(?:(?:(?:\r\n)?[ \t])+|\Z|(?=[\["()&lt;&gt; @,;:\\".\[\]]))|\[([^\[\]\r\\]|\\.)*\](?:(?:\r\n)?[ \t])*))*(?:,@(?:(?:\r\n)?[ \t])*(?:[^()&lt;&gt;@,;:\\".\[\] \000-\031]+(?:(?:(?:\r\n)?[ \t])+|\Z|(?=[\["()&lt;&gt;@, ;:\\".\[\]]))|\[([^\[\]\r\\]|\\.)*\](?:(?:\r\n)?[ \t])*)(?:\.(?:(?:\r\n)?[ \t] )*(?:[^()&lt;&gt;@,;:\\".\[\] \000-\031]+(?:(?:(?:\r\n)?[ \t])+|\Z|(?=[\["()&lt;&gt;@,;:\\ ".\[\]]))|\[([^\[\]\r\\]|\\.)*\](?:(?:\r\n)?[ \t])*))*)*:(?:(?:\r\n)?[ \t])*)? (?:[^()&lt;&gt;@,;:\\".\[\] \000-\031]+(?:(?:(?:\r\n)?[ \t])+|\Z|(?=[\["()&lt;&gt;@,;:\\". \[\]]))|"(?:[^\"\r\\]|\\.|(?:(?:\r\n)?[ \t]))*"(?:(?:\r\n)?[ \t])*)(?:\.(?:(?: \r\n)?[ \t])*(?:[^()&lt;&gt;@,;:\\".\[\] \000-\031]+(?:(?:(?:\r\n)?[ \t])+|\Z|(?=[\[ "()&lt;&gt;@,;:\\".\[\]]))|"(?:[^\"\r\\]|\\.|(?:(?:\r\n)?[ \t]))*"(?:(?:\r\n)?[ \t]) *))*@(?:(?:\r\n)?[ \t])*(?:[^()&lt;&gt;@,;:\\".\[\] \000-\031]+(?:(?:(?:\r\n)?[ \t]) +|\Z|(?=[\["()&lt;&gt;@,;:\\".\[\]]))|\[([^\[\]\r\\]|\\.)*\](?:(?:\r\n)?[ \t])*)(?:\ .(?:(?:\r\n)?[ \t])*(?:[^()&lt;&gt;@,;:\\".\[\] \000-\031]+(?:(?:(?:\r\n)?[ \t])+|\Z |(?=[\["()&lt;&gt;@,;:\\".\[\]]))|\[([^\[\]\r\\]|\\.)*\](?:(?:\r\n)?[ \t])*))*\&gt;(?:( ?:\r\n)?[ \t])*))*)?;\s*)</a:t>
+            </a:r>
+            <a:endParaRPr lang="de-DE" sz="700" b="1" dirty="0" smtClean="0">
+              <a:ln w="12700">
+                <a:noFill/>
+                <a:prstDash val="solid"/>
+              </a:ln>
+              <a:solidFill>
+                <a:schemeClr val="tx2"/>
+              </a:solidFill>
+              <a:effectLst>
+                <a:outerShdw blurRad="41275" dist="20320" dir="1800000" algn="tl" rotWithShape="0">
+                  <a:srgbClr val="000000">
+                    <a:alpha val="40000"/>
+                  </a:srgbClr>
+                </a:outerShdw>
+              </a:effectLst>
+            </a:endParaRPr>
+          </a:p>
+        </p:txBody>
+      </p:sp>
+    </p:spTree>
+  </p:cSld>
+  <p:clrMapOvr>
+    <a:masterClrMapping/>
+  </p:clrMapOvr>
+  <p:transition/>
+</p:sld>
+</file>
+
+<file path=ppt/slides/slide7.xml><?xml version="1.0" encoding="utf-8"?>
+<p:sld xmlns:a="http://schemas.openxmlformats.org/drawingml/2006/main" xmlns:r="http://schemas.openxmlformats.org/officeDocument/2006/relationships" xmlns:p="http://schemas.openxmlformats.org/presentationml/2006/main">
+  <p:cSld>
+    <p:spTree>
+      <p:nvGrpSpPr>
+        <p:cNvPr id="1" name=""/>
+        <p:cNvGrpSpPr/>
+        <p:nvPr/>
+      </p:nvGrpSpPr>
+      <p:grpSpPr>
+        <a:xfrm>
+          <a:off x="0" y="0"/>
+          <a:ext cx="0" cy="0"/>
+          <a:chOff x="0" y="0"/>
+          <a:chExt cx="0" cy="0"/>
+        </a:xfrm>
+      </p:grpSpPr>
+      <p:sp>
+        <p:nvSpPr>
+          <p:cNvPr id="6146" name="Titel 1"/>
+          <p:cNvSpPr>
+            <a:spLocks noGrp="1"/>
+          </p:cNvSpPr>
+          <p:nvPr>
+            <p:ph type="title"/>
+          </p:nvPr>
+        </p:nvSpPr>
+        <p:spPr/>
+        <p:txBody>
+          <a:bodyPr/>
+          <a:lstStyle/>
+          <a:p>
             <a:pPr eaLnBrk="1" hangingPunct="1"/>
             <a:r>
-              <a:rPr lang="de-DE" dirty="0">
+              <a:rPr lang="de-DE" dirty="0" smtClean="0">
+                <a:latin typeface="Arial" charset="0"/>
+                <a:ea typeface="ＭＳ Ｐゴシック" charset="0"/>
+              </a:rPr>
+              <a:t>N Problems</a:t>
+            </a:r>
+            <a:endParaRPr lang="de-DE" dirty="0">
+              <a:latin typeface="Arial" charset="0"/>
+              <a:ea typeface="ＭＳ Ｐゴシック" charset="0"/>
+            </a:endParaRPr>
+          </a:p>
+        </p:txBody>
+      </p:sp>
+      <p:sp>
+        <p:nvSpPr>
+          <p:cNvPr id="6147" name="Inhaltsplatzhalter 2"/>
+          <p:cNvSpPr>
+            <a:spLocks noGrp="1"/>
+          </p:cNvSpPr>
+          <p:nvPr>
+            <p:ph idx="1"/>
+          </p:nvPr>
+        </p:nvSpPr>
+        <p:spPr/>
+        <p:txBody>
+          <a:bodyPr/>
+          <a:lstStyle/>
+          <a:p>
+            <a:r>
+              <a:rPr lang="en-US" dirty="0" smtClean="0"/>
+              <a:t>“Some people, when confronted with a problem, think: ‘I know, I'll </a:t>
+            </a:r>
+            <a:r>
+              <a:rPr lang="en-US" dirty="0" smtClean="0"/>
+              <a:t>use regular </a:t>
+            </a:r>
+            <a:r>
+              <a:rPr lang="en-US" dirty="0" smtClean="0"/>
+              <a:t>expressions.' Now they have </a:t>
+            </a:r>
+            <a:r>
+              <a:rPr lang="en-US" dirty="0" smtClean="0"/>
+              <a:t>two </a:t>
+            </a:r>
+            <a:r>
+              <a:rPr lang="en-US" dirty="0" smtClean="0"/>
+              <a:t>problems”</a:t>
+            </a:r>
+          </a:p>
+          <a:p>
+            <a:r>
+              <a:rPr lang="en-US" dirty="0" smtClean="0"/>
+              <a:t>“</a:t>
+            </a:r>
+            <a:r>
+              <a:rPr lang="en-US" dirty="0" smtClean="0"/>
+              <a:t>Some people, when confronted with a problem, think: ‘I know, I'll create a DSL that wraps regular expressions.' Now they have three problems</a:t>
+            </a:r>
+            <a:r>
+              <a:rPr lang="en-US" dirty="0" smtClean="0"/>
+              <a:t>”</a:t>
+            </a:r>
+          </a:p>
+        </p:txBody>
+      </p:sp>
+    </p:spTree>
+  </p:cSld>
+  <p:clrMapOvr>
+    <a:masterClrMapping/>
+  </p:clrMapOvr>
+  <p:timing>
+    <p:tnLst>
+      <p:par>
+        <p:cTn id="1" dur="indefinite" restart="never" nodeType="tmRoot"/>
+      </p:par>
+    </p:tnLst>
+  </p:timing>
+</p:sld>
+</file>
+
+<file path=ppt/slides/slide8.xml><?xml version="1.0" encoding="utf-8"?>
+<p:sld xmlns:a="http://schemas.openxmlformats.org/drawingml/2006/main" xmlns:r="http://schemas.openxmlformats.org/officeDocument/2006/relationships" xmlns:p="http://schemas.openxmlformats.org/presentationml/2006/main">
+  <p:cSld>
+    <p:spTree>
+      <p:nvGrpSpPr>
+        <p:cNvPr id="1" name=""/>
+        <p:cNvGrpSpPr/>
+        <p:nvPr/>
+      </p:nvGrpSpPr>
+      <p:grpSpPr>
+        <a:xfrm>
+          <a:off x="0" y="0"/>
+          <a:ext cx="0" cy="0"/>
+          <a:chOff x="0" y="0"/>
+          <a:chExt cx="0" cy="0"/>
+        </a:xfrm>
+      </p:grpSpPr>
+      <p:sp>
+        <p:nvSpPr>
+          <p:cNvPr id="6146" name="Titel 1"/>
+          <p:cNvSpPr>
+            <a:spLocks noGrp="1"/>
+          </p:cNvSpPr>
+          <p:nvPr>
+            <p:ph type="title"/>
+          </p:nvPr>
+        </p:nvSpPr>
+        <p:spPr/>
+        <p:txBody>
+          <a:bodyPr/>
+          <a:lstStyle/>
+          <a:p>
+            <a:pPr eaLnBrk="1" hangingPunct="1"/>
+            <a:r>
+              <a:rPr lang="de-DE" dirty="0" smtClean="0">
+                <a:latin typeface="Arial" charset="0"/>
+                <a:ea typeface="ＭＳ Ｐゴシック" charset="0"/>
+              </a:rPr>
+              <a:t>N Problems</a:t>
+            </a:r>
+            <a:endParaRPr lang="de-DE" dirty="0">
+              <a:latin typeface="Arial" charset="0"/>
+              <a:ea typeface="ＭＳ Ｐゴシック" charset="0"/>
+            </a:endParaRPr>
+          </a:p>
+        </p:txBody>
+      </p:sp>
+      <p:sp>
+        <p:nvSpPr>
+          <p:cNvPr id="6147" name="Inhaltsplatzhalter 2"/>
+          <p:cNvSpPr>
+            <a:spLocks noGrp="1"/>
+          </p:cNvSpPr>
+          <p:nvPr>
+            <p:ph idx="1"/>
+          </p:nvPr>
+        </p:nvSpPr>
+        <p:spPr/>
+        <p:txBody>
+          <a:bodyPr/>
+          <a:lstStyle/>
+          <a:p>
+            <a:r>
+              <a:rPr lang="en-US" dirty="0" smtClean="0"/>
+              <a:t>The more complex the expression, the more surprised and god-like you’ll feel when it works.</a:t>
+            </a:r>
+          </a:p>
+          <a:p>
+            <a:r>
+              <a:rPr lang="en-US" dirty="0" smtClean="0"/>
+              <a:t>When you write one that works and you know no-one will ever understand, feel like Houdini mystifying everyone.</a:t>
+            </a:r>
+          </a:p>
+          <a:p>
+            <a:r>
+              <a:rPr lang="en-US" dirty="0" smtClean="0"/>
+              <a:t>You can strip down someone’s </a:t>
+            </a:r>
+            <a:r>
+              <a:rPr lang="en-US" dirty="0" err="1" smtClean="0"/>
+              <a:t>regex</a:t>
+            </a:r>
+            <a:r>
+              <a:rPr lang="en-US" dirty="0" smtClean="0"/>
+              <a:t> to pieces and yet never figure it out. Which makes you feel like looking at Houdini and God’s work combined.</a:t>
+            </a:r>
+          </a:p>
+          <a:p>
+            <a:r>
+              <a:rPr lang="en-US" dirty="0" smtClean="0"/>
+              <a:t>Old </a:t>
+            </a:r>
+            <a:r>
+              <a:rPr lang="en-US" dirty="0" err="1" smtClean="0"/>
+              <a:t>regexes</a:t>
+            </a:r>
+            <a:r>
+              <a:rPr lang="en-US" dirty="0" smtClean="0"/>
+              <a:t> (of yours) are like teenage kids, you know they came out of you, but you don’t quite get them anymore.</a:t>
+            </a:r>
+          </a:p>
+          <a:p>
+            <a:pPr lvl="1">
+              <a:buNone/>
+            </a:pPr>
+            <a:r>
+              <a:rPr lang="en-US" dirty="0" smtClean="0">
                 <a:latin typeface="Arial" charset="0"/>
                 <a:ea typeface="ＭＳ Ｐゴシック" charset="0"/>
                 <a:cs typeface="ＭＳ Ｐゴシック" charset="0"/>
               </a:rPr>
-              <a:t>Erste Gliederungsebene (24pt)</a:t>
-            </a:r>
-          </a:p>
-          <a:p>
-            <a:pPr lvl="1" eaLnBrk="1" hangingPunct="1"/>
-            <a:r>
-              <a:rPr lang="de-DE" dirty="0">
-                <a:latin typeface="Arial" charset="0"/>
-                <a:ea typeface="ＭＳ Ｐゴシック" charset="0"/>
-              </a:rPr>
-              <a:t>Zweite Gliederungsebene (und jede weitere 22pt)</a:t>
-            </a:r>
-          </a:p>
-          <a:p>
-            <a:pPr lvl="1" eaLnBrk="1" hangingPunct="1"/>
-            <a:endParaRPr lang="de-DE" dirty="0">
-              <a:latin typeface="Arial" charset="0"/>
-              <a:ea typeface="ＭＳ Ｐゴシック" charset="0"/>
-            </a:endParaRPr>
-          </a:p>
-          <a:p>
-            <a:pPr eaLnBrk="1" hangingPunct="1"/>
-            <a:r>
-              <a:rPr lang="de-DE" dirty="0">
+              <a:t>		(</a:t>
+            </a:r>
+            <a:r>
+              <a:rPr lang="en-US" sz="2000" dirty="0" smtClean="0">
                 <a:latin typeface="Arial" charset="0"/>
                 <a:ea typeface="ＭＳ Ｐゴシック" charset="0"/>
                 <a:cs typeface="ＭＳ Ｐゴシック" charset="0"/>
               </a:rPr>
-              <a:t>Bitte in der Folien-Master-Ansicht die Fußzeile </a:t>
-            </a:r>
-            <a:r>
-              <a:rPr lang="de-DE" dirty="0" smtClean="0">
+              <a:t>Franck </a:t>
+            </a:r>
+            <a:r>
+              <a:rPr lang="en-US" sz="2000" dirty="0" err="1" smtClean="0">
                 <a:latin typeface="Arial" charset="0"/>
                 <a:ea typeface="ＭＳ Ｐゴシック" charset="0"/>
                 <a:cs typeface="ＭＳ Ｐゴシック" charset="0"/>
               </a:rPr>
-              <a:t>anpassen </a:t>
-            </a:r>
-            <a:br>
-              <a:rPr lang="de-DE" dirty="0" smtClean="0">
+              <a:t>Mée</a:t>
+            </a:r>
+            <a:r>
+              <a:rPr lang="en-US" sz="2000" dirty="0" smtClean="0">
                 <a:latin typeface="Arial" charset="0"/>
                 <a:ea typeface="ＭＳ Ｐゴシック" charset="0"/>
                 <a:cs typeface="ＭＳ Ｐゴシック" charset="0"/>
               </a:rPr>
-            </a:br>
-            <a:r>
-              <a:rPr lang="de-DE" dirty="0" smtClean="0">
-                <a:latin typeface="Arial" charset="0"/>
-                <a:ea typeface="ＭＳ Ｐゴシック" charset="0"/>
-                <a:cs typeface="ＭＳ Ｐゴシック" charset="0"/>
-              </a:rPr>
-              <a:t>(</a:t>
-            </a:r>
-            <a:r>
-              <a:rPr lang="de-DE" dirty="0">
-                <a:latin typeface="Arial" charset="0"/>
-                <a:ea typeface="ＭＳ Ｐゴシック" charset="0"/>
-                <a:cs typeface="ＭＳ Ｐゴシック" charset="0"/>
-              </a:rPr>
-              <a:t>Titel – Autor</a:t>
-            </a:r>
-            <a:r>
-              <a:rPr lang="de-DE" dirty="0" smtClean="0">
-                <a:latin typeface="Arial" charset="0"/>
-                <a:ea typeface="ＭＳ Ｐゴシック" charset="0"/>
-                <a:cs typeface="ＭＳ Ｐゴシック" charset="0"/>
-              </a:rPr>
-              <a:t>)</a:t>
-            </a:r>
-            <a:br>
-              <a:rPr lang="de-DE" dirty="0" smtClean="0">
-                <a:latin typeface="Arial" charset="0"/>
-                <a:ea typeface="ＭＳ Ｐゴシック" charset="0"/>
-                <a:cs typeface="ＭＳ Ｐゴシック" charset="0"/>
-              </a:rPr>
-            </a:br>
-            <a:endParaRPr lang="de-DE" dirty="0">
+              <a:t>, a “friend” that likes regular expressions)</a:t>
+            </a:r>
+            <a:endParaRPr lang="de-DE" sz="2000" dirty="0" smtClean="0">
               <a:latin typeface="Arial" charset="0"/>
               <a:ea typeface="ＭＳ Ｐゴシック" charset="0"/>
               <a:cs typeface="ＭＳ Ｐゴシック" charset="0"/>
             </a:endParaRPr>
           </a:p>
           <a:p>
-            <a:pPr eaLnBrk="1" hangingPunct="1"/>
-            <a:r>
-              <a:rPr lang="de-DE" dirty="0">
-                <a:latin typeface="Arial" charset="0"/>
-                <a:ea typeface="ＭＳ Ｐゴシック" charset="0"/>
-                <a:cs typeface="ＭＳ Ｐゴシック" charset="0"/>
-              </a:rPr>
-              <a:t>Erste und letzte Seite dieser Vorlage bitte auf jeden Fall verwenden</a:t>
-            </a:r>
-            <a:br>
-              <a:rPr lang="de-DE" dirty="0">
-                <a:latin typeface="Arial" charset="0"/>
-                <a:ea typeface="ＭＳ Ｐゴシック" charset="0"/>
-                <a:cs typeface="ＭＳ Ｐゴシック" charset="0"/>
-              </a:rPr>
-            </a:br>
-            <a:endParaRPr lang="de-DE" dirty="0">
-              <a:latin typeface="Arial" charset="0"/>
-              <a:ea typeface="ＭＳ Ｐゴシック" charset="0"/>
-              <a:cs typeface="ＭＳ Ｐゴシック" charset="0"/>
-            </a:endParaRPr>
-          </a:p>
-          <a:p>
-            <a:pPr eaLnBrk="1" hangingPunct="1">
-              <a:buFont typeface="Wingdings" charset="0"/>
-              <a:buNone/>
-            </a:pPr>
-            <a:endParaRPr lang="de-DE" dirty="0">
-              <a:latin typeface="Arial" charset="0"/>
-              <a:ea typeface="ＭＳ Ｐゴシック" charset="0"/>
-              <a:cs typeface="ＭＳ Ｐゴシック" charset="0"/>
-            </a:endParaRPr>
+            <a:endParaRPr lang="en-US" dirty="0" smtClean="0"/>
           </a:p>
         </p:txBody>
       </p:sp>
@@ -2048,7 +3860,7 @@
 </p:sld>
 </file>
 
-<file path=ppt/slides/slide3.xml><?xml version="1.0" encoding="utf-8"?>
+<file path=ppt/slides/slide9.xml><?xml version="1.0" encoding="utf-8"?>
 <p:sld xmlns:a="http://schemas.openxmlformats.org/drawingml/2006/main" xmlns:r="http://schemas.openxmlformats.org/officeDocument/2006/relationships" xmlns:p="http://schemas.openxmlformats.org/presentationml/2006/main">
   <p:cSld>
     <p:spTree>
@@ -2111,7 +3923,7 @@
               <a:buNone/>
             </a:pPr>
             <a:r>
-              <a:rPr lang="de-DE" b="1">
+              <a:rPr lang="de-DE" b="1" dirty="0">
                 <a:latin typeface="Arial" charset="0"/>
                 <a:ea typeface="ＭＳ Ｐゴシック" charset="0"/>
                 <a:cs typeface="ＭＳ Ｐゴシック" charset="0"/>
@@ -2124,7 +3936,7 @@
               <a:buFont typeface="Wingdings" charset="0"/>
               <a:buNone/>
             </a:pPr>
-            <a:endParaRPr lang="de-DE" b="1">
+            <a:endParaRPr lang="de-DE" b="1" dirty="0">
               <a:latin typeface="Arial" charset="0"/>
               <a:ea typeface="ＭＳ Ｐゴシック" charset="0"/>
               <a:cs typeface="ＭＳ Ｐゴシック" charset="0"/>
@@ -2136,13 +3948,18 @@
               <a:buNone/>
             </a:pPr>
             <a:r>
-              <a:rPr lang="de-DE">
+              <a:rPr lang="de-DE" dirty="0" smtClean="0">
                 <a:latin typeface="Arial" charset="0"/>
                 <a:ea typeface="ＭＳ Ｐゴシック" charset="0"/>
                 <a:cs typeface="ＭＳ Ｐゴシック" charset="0"/>
               </a:rPr>
-              <a:t>vorname.nachname@mathema.de</a:t>
-            </a:r>
+              <a:t>Tim.bourguignon@mathema.de</a:t>
+            </a:r>
+            <a:endParaRPr lang="de-DE" dirty="0">
+              <a:latin typeface="Arial" charset="0"/>
+              <a:ea typeface="ＭＳ Ｐゴシック" charset="0"/>
+              <a:cs typeface="ＭＳ Ｐゴシック" charset="0"/>
+            </a:endParaRPr>
           </a:p>
         </p:txBody>
       </p:sp>
@@ -2470,4 +4287,287 @@
   </a:objectDefaults>
   <a:extraClrSchemeLst/>
 </a:theme>
+</file>
+
+<file path=ppt/theme/theme2.xml><?xml version="1.0" encoding="utf-8"?>
+<a:theme xmlns:a="http://schemas.openxmlformats.org/drawingml/2006/main" name="Thème Office">
+  <a:themeElements>
+    <a:clrScheme name="Office">
+      <a:dk1>
+        <a:sysClr val="windowText" lastClr="000000"/>
+      </a:dk1>
+      <a:lt1>
+        <a:sysClr val="window" lastClr="FFFFFF"/>
+      </a:lt1>
+      <a:dk2>
+        <a:srgbClr val="1F497D"/>
+      </a:dk2>
+      <a:lt2>
+        <a:srgbClr val="EEECE1"/>
+      </a:lt2>
+      <a:accent1>
+        <a:srgbClr val="4F81BD"/>
+      </a:accent1>
+      <a:accent2>
+        <a:srgbClr val="C0504D"/>
+      </a:accent2>
+      <a:accent3>
+        <a:srgbClr val="9BBB59"/>
+      </a:accent3>
+      <a:accent4>
+        <a:srgbClr val="8064A2"/>
+      </a:accent4>
+      <a:accent5>
+        <a:srgbClr val="4BACC6"/>
+      </a:accent5>
+      <a:accent6>
+        <a:srgbClr val="F79646"/>
+      </a:accent6>
+      <a:hlink>
+        <a:srgbClr val="0000FF"/>
+      </a:hlink>
+      <a:folHlink>
+        <a:srgbClr val="800080"/>
+      </a:folHlink>
+    </a:clrScheme>
+    <a:fontScheme name="Office">
+      <a:majorFont>
+        <a:latin typeface="Calibri"/>
+        <a:ea typeface=""/>
+        <a:cs typeface=""/>
+        <a:font script="Jpan" typeface="ＭＳ Ｐゴシック"/>
+        <a:font script="Hang" typeface="맑은 고딕"/>
+        <a:font script="Hans" typeface="宋体"/>
+        <a:font script="Hant" typeface="新細明體"/>
+        <a:font script="Arab" typeface="Times New Roman"/>
+        <a:font script="Hebr" typeface="Times New Roman"/>
+        <a:font script="Thai" typeface="Angsana New"/>
+        <a:font script="Ethi" typeface="Nyala"/>
+        <a:font script="Beng" typeface="Vrinda"/>
+        <a:font script="Gujr" typeface="Shruti"/>
+        <a:font script="Khmr" typeface="MoolBoran"/>
+        <a:font script="Knda" typeface="Tunga"/>
+        <a:font script="Guru" typeface="Raavi"/>
+        <a:font script="Cans" typeface="Euphemia"/>
+        <a:font script="Cher" typeface="Plantagenet Cherokee"/>
+        <a:font script="Yiii" typeface="Microsoft Yi Baiti"/>
+        <a:font script="Tibt" typeface="Microsoft Himalaya"/>
+        <a:font script="Thaa" typeface="MV Boli"/>
+        <a:font script="Deva" typeface="Mangal"/>
+        <a:font script="Telu" typeface="Gautami"/>
+        <a:font script="Taml" typeface="Latha"/>
+        <a:font script="Syrc" typeface="Estrangelo Edessa"/>
+        <a:font script="Orya" typeface="Kalinga"/>
+        <a:font script="Mlym" typeface="Kartika"/>
+        <a:font script="Laoo" typeface="DokChampa"/>
+        <a:font script="Sinh" typeface="Iskoola Pota"/>
+        <a:font script="Mong" typeface="Mongolian Baiti"/>
+        <a:font script="Viet" typeface="Times New Roman"/>
+        <a:font script="Uigh" typeface="Microsoft Uighur"/>
+      </a:majorFont>
+      <a:minorFont>
+        <a:latin typeface="Calibri"/>
+        <a:ea typeface=""/>
+        <a:cs typeface=""/>
+        <a:font script="Jpan" typeface="ＭＳ Ｐゴシック"/>
+        <a:font script="Hang" typeface="맑은 고딕"/>
+        <a:font script="Hans" typeface="宋体"/>
+        <a:font script="Hant" typeface="新細明體"/>
+        <a:font script="Arab" typeface="Arial"/>
+        <a:font script="Hebr" typeface="Arial"/>
+        <a:font script="Thai" typeface="Cordia New"/>
+        <a:font script="Ethi" typeface="Nyala"/>
+        <a:font script="Beng" typeface="Vrinda"/>
+        <a:font script="Gujr" typeface="Shruti"/>
+        <a:font script="Khmr" typeface="DaunPenh"/>
+        <a:font script="Knda" typeface="Tunga"/>
+        <a:font script="Guru" typeface="Raavi"/>
+        <a:font script="Cans" typeface="Euphemia"/>
+        <a:font script="Cher" typeface="Plantagenet Cherokee"/>
+        <a:font script="Yiii" typeface="Microsoft Yi Baiti"/>
+        <a:font script="Tibt" typeface="Microsoft Himalaya"/>
+        <a:font script="Thaa" typeface="MV Boli"/>
+        <a:font script="Deva" typeface="Mangal"/>
+        <a:font script="Telu" typeface="Gautami"/>
+        <a:font script="Taml" typeface="Latha"/>
+        <a:font script="Syrc" typeface="Estrangelo Edessa"/>
+        <a:font script="Orya" typeface="Kalinga"/>
+        <a:font script="Mlym" typeface="Kartika"/>
+        <a:font script="Laoo" typeface="DokChampa"/>
+        <a:font script="Sinh" typeface="Iskoola Pota"/>
+        <a:font script="Mong" typeface="Mongolian Baiti"/>
+        <a:font script="Viet" typeface="Arial"/>
+        <a:font script="Uigh" typeface="Microsoft Uighur"/>
+      </a:minorFont>
+    </a:fontScheme>
+    <a:fmtScheme name="Office">
+      <a:fillStyleLst>
+        <a:solidFill>
+          <a:schemeClr val="phClr"/>
+        </a:solidFill>
+        <a:gradFill rotWithShape="1">
+          <a:gsLst>
+            <a:gs pos="0">
+              <a:schemeClr val="phClr">
+                <a:tint val="50000"/>
+                <a:satMod val="300000"/>
+              </a:schemeClr>
+            </a:gs>
+            <a:gs pos="35000">
+              <a:schemeClr val="phClr">
+                <a:tint val="37000"/>
+                <a:satMod val="300000"/>
+              </a:schemeClr>
+            </a:gs>
+            <a:gs pos="100000">
+              <a:schemeClr val="phClr">
+                <a:tint val="15000"/>
+                <a:satMod val="350000"/>
+              </a:schemeClr>
+            </a:gs>
+          </a:gsLst>
+          <a:lin ang="16200000" scaled="1"/>
+        </a:gradFill>
+        <a:gradFill rotWithShape="1">
+          <a:gsLst>
+            <a:gs pos="0">
+              <a:schemeClr val="phClr">
+                <a:shade val="51000"/>
+                <a:satMod val="130000"/>
+              </a:schemeClr>
+            </a:gs>
+            <a:gs pos="80000">
+              <a:schemeClr val="phClr">
+                <a:shade val="93000"/>
+                <a:satMod val="130000"/>
+              </a:schemeClr>
+            </a:gs>
+            <a:gs pos="100000">
+              <a:schemeClr val="phClr">
+                <a:shade val="94000"/>
+                <a:satMod val="135000"/>
+              </a:schemeClr>
+            </a:gs>
+          </a:gsLst>
+          <a:lin ang="16200000" scaled="0"/>
+        </a:gradFill>
+      </a:fillStyleLst>
+      <a:lnStyleLst>
+        <a:ln w="9525" cap="flat" cmpd="sng" algn="ctr">
+          <a:solidFill>
+            <a:schemeClr val="phClr">
+              <a:shade val="95000"/>
+              <a:satMod val="105000"/>
+            </a:schemeClr>
+          </a:solidFill>
+          <a:prstDash val="solid"/>
+        </a:ln>
+        <a:ln w="25400" cap="flat" cmpd="sng" algn="ctr">
+          <a:solidFill>
+            <a:schemeClr val="phClr"/>
+          </a:solidFill>
+          <a:prstDash val="solid"/>
+        </a:ln>
+        <a:ln w="38100" cap="flat" cmpd="sng" algn="ctr">
+          <a:solidFill>
+            <a:schemeClr val="phClr"/>
+          </a:solidFill>
+          <a:prstDash val="solid"/>
+        </a:ln>
+      </a:lnStyleLst>
+      <a:effectStyleLst>
+        <a:effectStyle>
+          <a:effectLst>
+            <a:outerShdw blurRad="40000" dist="20000" dir="5400000" rotWithShape="0">
+              <a:srgbClr val="000000">
+                <a:alpha val="38000"/>
+              </a:srgbClr>
+            </a:outerShdw>
+          </a:effectLst>
+        </a:effectStyle>
+        <a:effectStyle>
+          <a:effectLst>
+            <a:outerShdw blurRad="40000" dist="23000" dir="5400000" rotWithShape="0">
+              <a:srgbClr val="000000">
+                <a:alpha val="35000"/>
+              </a:srgbClr>
+            </a:outerShdw>
+          </a:effectLst>
+        </a:effectStyle>
+        <a:effectStyle>
+          <a:effectLst>
+            <a:outerShdw blurRad="40000" dist="23000" dir="5400000" rotWithShape="0">
+              <a:srgbClr val="000000">
+                <a:alpha val="35000"/>
+              </a:srgbClr>
+            </a:outerShdw>
+          </a:effectLst>
+          <a:scene3d>
+            <a:camera prst="orthographicFront">
+              <a:rot lat="0" lon="0" rev="0"/>
+            </a:camera>
+            <a:lightRig rig="threePt" dir="t">
+              <a:rot lat="0" lon="0" rev="1200000"/>
+            </a:lightRig>
+          </a:scene3d>
+          <a:sp3d>
+            <a:bevelT w="63500" h="25400"/>
+          </a:sp3d>
+        </a:effectStyle>
+      </a:effectStyleLst>
+      <a:bgFillStyleLst>
+        <a:solidFill>
+          <a:schemeClr val="phClr"/>
+        </a:solidFill>
+        <a:gradFill rotWithShape="1">
+          <a:gsLst>
+            <a:gs pos="0">
+              <a:schemeClr val="phClr">
+                <a:tint val="40000"/>
+                <a:satMod val="350000"/>
+              </a:schemeClr>
+            </a:gs>
+            <a:gs pos="40000">
+              <a:schemeClr val="phClr">
+                <a:tint val="45000"/>
+                <a:shade val="99000"/>
+                <a:satMod val="350000"/>
+              </a:schemeClr>
+            </a:gs>
+            <a:gs pos="100000">
+              <a:schemeClr val="phClr">
+                <a:shade val="20000"/>
+                <a:satMod val="255000"/>
+              </a:schemeClr>
+            </a:gs>
+          </a:gsLst>
+          <a:path path="circle">
+            <a:fillToRect l="50000" t="-80000" r="50000" b="180000"/>
+          </a:path>
+        </a:gradFill>
+        <a:gradFill rotWithShape="1">
+          <a:gsLst>
+            <a:gs pos="0">
+              <a:schemeClr val="phClr">
+                <a:tint val="80000"/>
+                <a:satMod val="300000"/>
+              </a:schemeClr>
+            </a:gs>
+            <a:gs pos="100000">
+              <a:schemeClr val="phClr">
+                <a:shade val="30000"/>
+                <a:satMod val="200000"/>
+              </a:schemeClr>
+            </a:gs>
+          </a:gsLst>
+          <a:path path="circle">
+            <a:fillToRect l="50000" t="50000" r="50000" b="50000"/>
+          </a:path>
+        </a:gradFill>
+      </a:bgFillStyleLst>
+    </a:fmtScheme>
+  </a:themeElements>
+  <a:objectDefaults/>
+  <a:extraClrSchemeLst/>
+</a:theme>
 </file>
</xml_diff>